<commit_message>
Redacción de Diseño, revisión, redacción y correción en varios lugares
</commit_message>
<xml_diff>
--- a/Informe/Images/MVP.pptx
+++ b/Informe/Images/MVP.pptx
@@ -5,7 +5,7 @@
     <p:sldMasterId id="2147483648" r:id="rId1"/>
   </p:sldMasterIdLst>
   <p:sldIdLst>
-    <p:sldId id="256" r:id="rId2"/>
+    <p:sldId id="257" r:id="rId2"/>
   </p:sldIdLst>
   <p:sldSz cx="12192000" cy="6858000"/>
   <p:notesSz cx="6858000" cy="9144000"/>
@@ -104,6 +104,11 @@
       </a:defRPr>
     </a:lvl9pPr>
   </p:defaultTextStyle>
+  <p:extLst>
+    <p:ext uri="{EFAFB233-063F-42B5-8137-9DF3F51BA10A}">
+      <p15:sldGuideLst xmlns:p15="http://schemas.microsoft.com/office/powerpoint/2012/main"/>
+    </p:ext>
+  </p:extLst>
 </p:presentation>
 </file>
 
@@ -256,7 +261,7 @@
           <a:p>
             <a:fld id="{9393FD87-CB66-4628-A0CB-CD2678E0D5AC}" type="datetimeFigureOut">
               <a:rPr lang="es-BO" smtClean="0"/>
-              <a:t>6/12/2020</a:t>
+              <a:t>8/12/2020</a:t>
             </a:fld>
             <a:endParaRPr lang="es-BO"/>
           </a:p>
@@ -456,7 +461,7 @@
           <a:p>
             <a:fld id="{9393FD87-CB66-4628-A0CB-CD2678E0D5AC}" type="datetimeFigureOut">
               <a:rPr lang="es-BO" smtClean="0"/>
-              <a:t>6/12/2020</a:t>
+              <a:t>8/12/2020</a:t>
             </a:fld>
             <a:endParaRPr lang="es-BO"/>
           </a:p>
@@ -666,7 +671,7 @@
           <a:p>
             <a:fld id="{9393FD87-CB66-4628-A0CB-CD2678E0D5AC}" type="datetimeFigureOut">
               <a:rPr lang="es-BO" smtClean="0"/>
-              <a:t>6/12/2020</a:t>
+              <a:t>8/12/2020</a:t>
             </a:fld>
             <a:endParaRPr lang="es-BO"/>
           </a:p>
@@ -866,7 +871,7 @@
           <a:p>
             <a:fld id="{9393FD87-CB66-4628-A0CB-CD2678E0D5AC}" type="datetimeFigureOut">
               <a:rPr lang="es-BO" smtClean="0"/>
-              <a:t>6/12/2020</a:t>
+              <a:t>8/12/2020</a:t>
             </a:fld>
             <a:endParaRPr lang="es-BO"/>
           </a:p>
@@ -1142,7 +1147,7 @@
           <a:p>
             <a:fld id="{9393FD87-CB66-4628-A0CB-CD2678E0D5AC}" type="datetimeFigureOut">
               <a:rPr lang="es-BO" smtClean="0"/>
-              <a:t>6/12/2020</a:t>
+              <a:t>8/12/2020</a:t>
             </a:fld>
             <a:endParaRPr lang="es-BO"/>
           </a:p>
@@ -1410,7 +1415,7 @@
           <a:p>
             <a:fld id="{9393FD87-CB66-4628-A0CB-CD2678E0D5AC}" type="datetimeFigureOut">
               <a:rPr lang="es-BO" smtClean="0"/>
-              <a:t>6/12/2020</a:t>
+              <a:t>8/12/2020</a:t>
             </a:fld>
             <a:endParaRPr lang="es-BO"/>
           </a:p>
@@ -1825,7 +1830,7 @@
           <a:p>
             <a:fld id="{9393FD87-CB66-4628-A0CB-CD2678E0D5AC}" type="datetimeFigureOut">
               <a:rPr lang="es-BO" smtClean="0"/>
-              <a:t>6/12/2020</a:t>
+              <a:t>8/12/2020</a:t>
             </a:fld>
             <a:endParaRPr lang="es-BO"/>
           </a:p>
@@ -1967,7 +1972,7 @@
           <a:p>
             <a:fld id="{9393FD87-CB66-4628-A0CB-CD2678E0D5AC}" type="datetimeFigureOut">
               <a:rPr lang="es-BO" smtClean="0"/>
-              <a:t>6/12/2020</a:t>
+              <a:t>8/12/2020</a:t>
             </a:fld>
             <a:endParaRPr lang="es-BO"/>
           </a:p>
@@ -2080,7 +2085,7 @@
           <a:p>
             <a:fld id="{9393FD87-CB66-4628-A0CB-CD2678E0D5AC}" type="datetimeFigureOut">
               <a:rPr lang="es-BO" smtClean="0"/>
-              <a:t>6/12/2020</a:t>
+              <a:t>8/12/2020</a:t>
             </a:fld>
             <a:endParaRPr lang="es-BO"/>
           </a:p>
@@ -2393,7 +2398,7 @@
           <a:p>
             <a:fld id="{9393FD87-CB66-4628-A0CB-CD2678E0D5AC}" type="datetimeFigureOut">
               <a:rPr lang="es-BO" smtClean="0"/>
-              <a:t>6/12/2020</a:t>
+              <a:t>8/12/2020</a:t>
             </a:fld>
             <a:endParaRPr lang="es-BO"/>
           </a:p>
@@ -2682,7 +2687,7 @@
           <a:p>
             <a:fld id="{9393FD87-CB66-4628-A0CB-CD2678E0D5AC}" type="datetimeFigureOut">
               <a:rPr lang="es-BO" smtClean="0"/>
-              <a:t>6/12/2020</a:t>
+              <a:t>8/12/2020</a:t>
             </a:fld>
             <a:endParaRPr lang="es-BO"/>
           </a:p>
@@ -2925,7 +2930,7 @@
           <a:p>
             <a:fld id="{9393FD87-CB66-4628-A0CB-CD2678E0D5AC}" type="datetimeFigureOut">
               <a:rPr lang="es-BO" smtClean="0"/>
-              <a:t>6/12/2020</a:t>
+              <a:t>8/12/2020</a:t>
             </a:fld>
             <a:endParaRPr lang="es-BO"/>
           </a:p>
@@ -3357,7 +3362,7 @@
         <p:spPr>
           <a:xfrm>
             <a:off x="3455586" y="1149292"/>
-            <a:ext cx="5280827" cy="4426506"/>
+            <a:ext cx="6345639" cy="4426506"/>
           </a:xfrm>
           <a:prstGeom prst="rect">
             <a:avLst/>
@@ -3390,7 +3395,7 @@
           <a:lstStyle/>
           <a:p>
             <a:pPr algn="ctr"/>
-            <a:endParaRPr lang="es-BO"/>
+            <a:endParaRPr lang="es-BO" dirty="0"/>
           </a:p>
         </p:txBody>
       </p:sp>
@@ -3408,7 +3413,7 @@
         </p:nvSpPr>
         <p:spPr>
           <a:xfrm>
-            <a:off x="478894" y="860571"/>
+            <a:off x="451991" y="837411"/>
             <a:ext cx="2163640" cy="577442"/>
           </a:xfrm>
           <a:prstGeom prst="rect">
@@ -3455,10 +3460,10 @@
       </p:sp>
       <p:sp>
         <p:nvSpPr>
-          <p:cNvPr id="6" name="Rectangle 5">
-            <a:extLst>
-              <a:ext uri="{FF2B5EF4-FFF2-40B4-BE49-F238E27FC236}">
-                <a16:creationId xmlns:a16="http://schemas.microsoft.com/office/drawing/2014/main" id="{B3025236-40D7-42E4-A70B-72214FA117BE}"/>
+          <p:cNvPr id="7" name="Rectangle 6">
+            <a:extLst>
+              <a:ext uri="{FF2B5EF4-FFF2-40B4-BE49-F238E27FC236}">
+                <a16:creationId xmlns:a16="http://schemas.microsoft.com/office/drawing/2014/main" id="{A714CD10-60D8-4CDD-805E-491DBE0C83BE}"/>
               </a:ext>
             </a:extLst>
           </p:cNvPr>
@@ -3467,8 +3472,8 @@
         </p:nvSpPr>
         <p:spPr>
           <a:xfrm>
-            <a:off x="478894" y="5287077"/>
-            <a:ext cx="2163640" cy="577442"/>
+            <a:off x="3455585" y="1895389"/>
+            <a:ext cx="1930503" cy="938883"/>
           </a:xfrm>
           <a:prstGeom prst="rect">
             <a:avLst/>
@@ -3502,22 +3507,118 @@
           <a:p>
             <a:pPr algn="ctr"/>
             <a:r>
-              <a:rPr lang="es-BO" dirty="0">
+              <a:rPr lang="es-BO" sz="1600" dirty="0">
                 <a:solidFill>
                   <a:schemeClr val="tx1"/>
                 </a:solidFill>
               </a:rPr>
-              <a:t>Creador de Mapas</a:t>
-            </a:r>
-          </a:p>
-        </p:txBody>
-      </p:sp>
-      <p:sp>
-        <p:nvSpPr>
-          <p:cNvPr id="7" name="Rectangle 6">
-            <a:extLst>
-              <a:ext uri="{FF2B5EF4-FFF2-40B4-BE49-F238E27FC236}">
-                <a16:creationId xmlns:a16="http://schemas.microsoft.com/office/drawing/2014/main" id="{A714CD10-60D8-4CDD-805E-491DBE0C83BE}"/>
+              <a:t>Menú Principal</a:t>
+            </a:r>
+          </a:p>
+          <a:p>
+            <a:pPr algn="ctr"/>
+            <a:r>
+              <a:rPr lang="es-BO" sz="1600" dirty="0">
+                <a:solidFill>
+                  <a:schemeClr val="tx1"/>
+                </a:solidFill>
+              </a:rPr>
+              <a:t>(Interfaz Persona-Software)</a:t>
+            </a:r>
+          </a:p>
+        </p:txBody>
+      </p:sp>
+      <p:cxnSp>
+        <p:nvCxnSpPr>
+          <p:cNvPr id="11" name="Connector: Elbow 10">
+            <a:extLst>
+              <a:ext uri="{FF2B5EF4-FFF2-40B4-BE49-F238E27FC236}">
+                <a16:creationId xmlns:a16="http://schemas.microsoft.com/office/drawing/2014/main" id="{542A3388-BD50-4310-B7D0-B6264AA0442A}"/>
+              </a:ext>
+            </a:extLst>
+          </p:cNvPr>
+          <p:cNvCxnSpPr>
+            <a:cxnSpLocks/>
+            <a:stCxn id="5" idx="2"/>
+          </p:cNvCxnSpPr>
+          <p:nvPr/>
+        </p:nvCxnSpPr>
+        <p:spPr>
+          <a:xfrm rot="16200000" flipH="1">
+            <a:off x="2015655" y="933009"/>
+            <a:ext cx="931180" cy="1894868"/>
+          </a:xfrm>
+          <a:prstGeom prst="bentConnector2">
+            <a:avLst/>
+          </a:prstGeom>
+          <a:ln>
+            <a:tailEnd type="triangle"/>
+          </a:ln>
+        </p:spPr>
+        <p:style>
+          <a:lnRef idx="1">
+            <a:schemeClr val="accent1"/>
+          </a:lnRef>
+          <a:fillRef idx="0">
+            <a:schemeClr val="accent1"/>
+          </a:fillRef>
+          <a:effectRef idx="0">
+            <a:schemeClr val="accent1"/>
+          </a:effectRef>
+          <a:fontRef idx="minor">
+            <a:schemeClr val="tx1"/>
+          </a:fontRef>
+        </p:style>
+      </p:cxnSp>
+      <p:sp>
+        <p:nvSpPr>
+          <p:cNvPr id="2" name="TextBox 1">
+            <a:extLst>
+              <a:ext uri="{FF2B5EF4-FFF2-40B4-BE49-F238E27FC236}">
+                <a16:creationId xmlns:a16="http://schemas.microsoft.com/office/drawing/2014/main" id="{D5105CE0-1F84-42B4-80A0-A0763C228547}"/>
+              </a:ext>
+            </a:extLst>
+          </p:cNvPr>
+          <p:cNvSpPr txBox="1"/>
+          <p:nvPr/>
+        </p:nvSpPr>
+        <p:spPr>
+          <a:xfrm>
+            <a:off x="4666152" y="1286020"/>
+            <a:ext cx="2859694" cy="646331"/>
+          </a:xfrm>
+          <a:prstGeom prst="rect">
+            <a:avLst/>
+          </a:prstGeom>
+          <a:noFill/>
+        </p:spPr>
+        <p:txBody>
+          <a:bodyPr wrap="none" rtlCol="0">
+            <a:spAutoFit/>
+          </a:bodyPr>
+          <a:lstStyle/>
+          <a:p>
+            <a:pPr algn="ctr"/>
+            <a:r>
+              <a:rPr lang="es-BO" dirty="0"/>
+              <a:t>(Análisis de Requerimientos)</a:t>
+            </a:r>
+          </a:p>
+          <a:p>
+            <a:pPr algn="ctr"/>
+            <a:r>
+              <a:rPr lang="es-BO" dirty="0"/>
+              <a:t>Play</a:t>
+            </a:r>
+          </a:p>
+        </p:txBody>
+      </p:sp>
+      <p:sp>
+        <p:nvSpPr>
+          <p:cNvPr id="12" name="Rectangle 11">
+            <a:extLst>
+              <a:ext uri="{FF2B5EF4-FFF2-40B4-BE49-F238E27FC236}">
+                <a16:creationId xmlns:a16="http://schemas.microsoft.com/office/drawing/2014/main" id="{BB77BCEC-4C29-437C-A895-F49510BEDB85}"/>
               </a:ext>
             </a:extLst>
           </p:cNvPr>
@@ -3526,8 +3627,8 @@
         </p:nvSpPr>
         <p:spPr>
           <a:xfrm>
-            <a:off x="3777839" y="2064743"/>
-            <a:ext cx="2163640" cy="577442"/>
+            <a:off x="3564577" y="3082286"/>
+            <a:ext cx="1171462" cy="280259"/>
           </a:xfrm>
           <a:prstGeom prst="rect">
             <a:avLst/>
@@ -3560,16 +3661,23 @@
           <a:lstStyle/>
           <a:p>
             <a:pPr algn="ctr"/>
-            <a:endParaRPr lang="es-BO" dirty="0"/>
-          </a:p>
-        </p:txBody>
-      </p:sp>
-      <p:sp>
-        <p:nvSpPr>
-          <p:cNvPr id="8" name="Rectangle 7">
-            <a:extLst>
-              <a:ext uri="{FF2B5EF4-FFF2-40B4-BE49-F238E27FC236}">
-                <a16:creationId xmlns:a16="http://schemas.microsoft.com/office/drawing/2014/main" id="{77A7C658-8AE2-4CCD-8F07-0C37E99E0331}"/>
+            <a:r>
+              <a:rPr lang="es-BO" dirty="0">
+                <a:solidFill>
+                  <a:schemeClr val="tx1"/>
+                </a:solidFill>
+              </a:rPr>
+              <a:t>Jugar</a:t>
+            </a:r>
+          </a:p>
+        </p:txBody>
+      </p:sp>
+      <p:sp>
+        <p:nvSpPr>
+          <p:cNvPr id="13" name="Rectangle 12">
+            <a:extLst>
+              <a:ext uri="{FF2B5EF4-FFF2-40B4-BE49-F238E27FC236}">
+                <a16:creationId xmlns:a16="http://schemas.microsoft.com/office/drawing/2014/main" id="{81499A65-9C9B-4C8F-85D3-7B2E3F04C8A2}"/>
               </a:ext>
             </a:extLst>
           </p:cNvPr>
@@ -3578,8 +3686,8 @@
         </p:nvSpPr>
         <p:spPr>
           <a:xfrm>
-            <a:off x="3777839" y="4200088"/>
-            <a:ext cx="2163640" cy="577442"/>
+            <a:off x="3564577" y="3868554"/>
+            <a:ext cx="1171462" cy="280259"/>
           </a:xfrm>
           <a:prstGeom prst="rect">
             <a:avLst/>
@@ -3612,29 +3720,567 @@
           <a:lstStyle/>
           <a:p>
             <a:pPr algn="ctr"/>
-            <a:endParaRPr lang="es-BO"/>
+            <a:r>
+              <a:rPr lang="es-BO" dirty="0">
+                <a:solidFill>
+                  <a:schemeClr val="tx1"/>
+                </a:solidFill>
+              </a:rPr>
+              <a:t>Opciones</a:t>
+            </a:r>
+          </a:p>
+        </p:txBody>
+      </p:sp>
+      <p:sp>
+        <p:nvSpPr>
+          <p:cNvPr id="14" name="Rectangle 13">
+            <a:extLst>
+              <a:ext uri="{FF2B5EF4-FFF2-40B4-BE49-F238E27FC236}">
+                <a16:creationId xmlns:a16="http://schemas.microsoft.com/office/drawing/2014/main" id="{969DD427-C42E-4B0C-B694-34252A18BE74}"/>
+              </a:ext>
+            </a:extLst>
+          </p:cNvPr>
+          <p:cNvSpPr/>
+          <p:nvPr/>
+        </p:nvSpPr>
+        <p:spPr>
+          <a:xfrm>
+            <a:off x="8237969" y="4859904"/>
+            <a:ext cx="1563256" cy="715894"/>
+          </a:xfrm>
+          <a:prstGeom prst="rect">
+            <a:avLst/>
+          </a:prstGeom>
+          <a:solidFill>
+            <a:schemeClr val="bg1"/>
+          </a:solidFill>
+          <a:ln>
+            <a:solidFill>
+              <a:schemeClr val="tx1"/>
+            </a:solidFill>
+          </a:ln>
+        </p:spPr>
+        <p:style>
+          <a:lnRef idx="0">
+            <a:scrgbClr r="0" g="0" b="0"/>
+          </a:lnRef>
+          <a:fillRef idx="0">
+            <a:scrgbClr r="0" g="0" b="0"/>
+          </a:fillRef>
+          <a:effectRef idx="0">
+            <a:scrgbClr r="0" g="0" b="0"/>
+          </a:effectRef>
+          <a:fontRef idx="minor">
+            <a:schemeClr val="lt1"/>
+          </a:fontRef>
+        </p:style>
+        <p:txBody>
+          <a:bodyPr rtlCol="0" anchor="ctr"/>
+          <a:lstStyle/>
+          <a:p>
+            <a:pPr algn="ctr"/>
+            <a:r>
+              <a:rPr lang="es-BO" dirty="0">
+                <a:solidFill>
+                  <a:schemeClr val="tx1"/>
+                </a:solidFill>
+              </a:rPr>
+              <a:t>Salir</a:t>
+            </a:r>
+          </a:p>
+        </p:txBody>
+      </p:sp>
+      <p:sp>
+        <p:nvSpPr>
+          <p:cNvPr id="16" name="Rectangle 15">
+            <a:extLst>
+              <a:ext uri="{FF2B5EF4-FFF2-40B4-BE49-F238E27FC236}">
+                <a16:creationId xmlns:a16="http://schemas.microsoft.com/office/drawing/2014/main" id="{457A784E-4229-49FF-BC60-4AB269D16444}"/>
+              </a:ext>
+            </a:extLst>
+          </p:cNvPr>
+          <p:cNvSpPr/>
+          <p:nvPr/>
+        </p:nvSpPr>
+        <p:spPr>
+          <a:xfrm>
+            <a:off x="4762946" y="3082286"/>
+            <a:ext cx="2175616" cy="280259"/>
+          </a:xfrm>
+          <a:prstGeom prst="rect">
+            <a:avLst/>
+          </a:prstGeom>
+          <a:solidFill>
+            <a:schemeClr val="bg1"/>
+          </a:solidFill>
+          <a:ln>
+            <a:solidFill>
+              <a:schemeClr val="tx1"/>
+            </a:solidFill>
+          </a:ln>
+        </p:spPr>
+        <p:style>
+          <a:lnRef idx="0">
+            <a:scrgbClr r="0" g="0" b="0"/>
+          </a:lnRef>
+          <a:fillRef idx="0">
+            <a:scrgbClr r="0" g="0" b="0"/>
+          </a:fillRef>
+          <a:effectRef idx="0">
+            <a:scrgbClr r="0" g="0" b="0"/>
+          </a:effectRef>
+          <a:fontRef idx="minor">
+            <a:schemeClr val="lt1"/>
+          </a:fontRef>
+        </p:style>
+        <p:txBody>
+          <a:bodyPr rtlCol="0" anchor="ctr"/>
+          <a:lstStyle/>
+          <a:p>
+            <a:pPr algn="ctr"/>
+            <a:r>
+              <a:rPr lang="es-BO" sz="1400" dirty="0">
+                <a:solidFill>
+                  <a:schemeClr val="tx1"/>
+                </a:solidFill>
+              </a:rPr>
+              <a:t>Selección de Nivel Deseado</a:t>
+            </a:r>
+          </a:p>
+        </p:txBody>
+      </p:sp>
+      <p:sp>
+        <p:nvSpPr>
+          <p:cNvPr id="17" name="Rectangle 16">
+            <a:extLst>
+              <a:ext uri="{FF2B5EF4-FFF2-40B4-BE49-F238E27FC236}">
+                <a16:creationId xmlns:a16="http://schemas.microsoft.com/office/drawing/2014/main" id="{EF88D443-BC56-4B4F-A890-849E94EA2D38}"/>
+              </a:ext>
+            </a:extLst>
+          </p:cNvPr>
+          <p:cNvSpPr/>
+          <p:nvPr/>
+        </p:nvSpPr>
+        <p:spPr>
+          <a:xfrm>
+            <a:off x="7006769" y="2335823"/>
+            <a:ext cx="1171462" cy="530270"/>
+          </a:xfrm>
+          <a:prstGeom prst="rect">
+            <a:avLst/>
+          </a:prstGeom>
+          <a:solidFill>
+            <a:schemeClr val="bg1"/>
+          </a:solidFill>
+          <a:ln>
+            <a:solidFill>
+              <a:schemeClr val="tx1"/>
+            </a:solidFill>
+          </a:ln>
+        </p:spPr>
+        <p:style>
+          <a:lnRef idx="0">
+            <a:scrgbClr r="0" g="0" b="0"/>
+          </a:lnRef>
+          <a:fillRef idx="0">
+            <a:scrgbClr r="0" g="0" b="0"/>
+          </a:fillRef>
+          <a:effectRef idx="0">
+            <a:scrgbClr r="0" g="0" b="0"/>
+          </a:effectRef>
+          <a:fontRef idx="minor">
+            <a:schemeClr val="lt1"/>
+          </a:fontRef>
+        </p:style>
+        <p:txBody>
+          <a:bodyPr rtlCol="0" anchor="ctr"/>
+          <a:lstStyle/>
+          <a:p>
+            <a:pPr algn="ctr"/>
+            <a:r>
+              <a:rPr lang="es-BO" sz="1600" dirty="0">
+                <a:solidFill>
+                  <a:schemeClr val="tx1"/>
+                </a:solidFill>
+              </a:rPr>
+              <a:t>Mostrar Calificación</a:t>
+            </a:r>
+          </a:p>
+        </p:txBody>
+      </p:sp>
+      <p:sp>
+        <p:nvSpPr>
+          <p:cNvPr id="18" name="Rectangle 17">
+            <a:extLst>
+              <a:ext uri="{FF2B5EF4-FFF2-40B4-BE49-F238E27FC236}">
+                <a16:creationId xmlns:a16="http://schemas.microsoft.com/office/drawing/2014/main" id="{6687EAAB-433C-44A5-8DA9-EDC29BE33DAF}"/>
+              </a:ext>
+            </a:extLst>
+          </p:cNvPr>
+          <p:cNvSpPr/>
+          <p:nvPr/>
+        </p:nvSpPr>
+        <p:spPr>
+          <a:xfrm>
+            <a:off x="7006769" y="2968903"/>
+            <a:ext cx="1171462" cy="530270"/>
+          </a:xfrm>
+          <a:prstGeom prst="rect">
+            <a:avLst/>
+          </a:prstGeom>
+          <a:solidFill>
+            <a:schemeClr val="bg1"/>
+          </a:solidFill>
+          <a:ln>
+            <a:solidFill>
+              <a:schemeClr val="tx1"/>
+            </a:solidFill>
+          </a:ln>
+        </p:spPr>
+        <p:style>
+          <a:lnRef idx="0">
+            <a:scrgbClr r="0" g="0" b="0"/>
+          </a:lnRef>
+          <a:fillRef idx="0">
+            <a:scrgbClr r="0" g="0" b="0"/>
+          </a:fillRef>
+          <a:effectRef idx="0">
+            <a:scrgbClr r="0" g="0" b="0"/>
+          </a:effectRef>
+          <a:fontRef idx="minor">
+            <a:schemeClr val="lt1"/>
+          </a:fontRef>
+        </p:style>
+        <p:txBody>
+          <a:bodyPr rtlCol="0" anchor="ctr"/>
+          <a:lstStyle/>
+          <a:p>
+            <a:pPr algn="ctr"/>
+            <a:r>
+              <a:rPr lang="es-BO" sz="1600" dirty="0">
+                <a:solidFill>
+                  <a:schemeClr val="tx1"/>
+                </a:solidFill>
+              </a:rPr>
+              <a:t>Salir del Mapa</a:t>
+            </a:r>
+          </a:p>
+        </p:txBody>
+      </p:sp>
+      <p:sp>
+        <p:nvSpPr>
+          <p:cNvPr id="19" name="Rectangle 18">
+            <a:extLst>
+              <a:ext uri="{FF2B5EF4-FFF2-40B4-BE49-F238E27FC236}">
+                <a16:creationId xmlns:a16="http://schemas.microsoft.com/office/drawing/2014/main" id="{C3E585DC-E769-465E-859B-410DF1FE6953}"/>
+              </a:ext>
+            </a:extLst>
+          </p:cNvPr>
+          <p:cNvSpPr/>
+          <p:nvPr/>
+        </p:nvSpPr>
+        <p:spPr>
+          <a:xfrm>
+            <a:off x="4762946" y="3685490"/>
+            <a:ext cx="1171462" cy="280259"/>
+          </a:xfrm>
+          <a:prstGeom prst="rect">
+            <a:avLst/>
+          </a:prstGeom>
+          <a:solidFill>
+            <a:schemeClr val="bg1"/>
+          </a:solidFill>
+          <a:ln>
+            <a:solidFill>
+              <a:schemeClr val="tx1"/>
+            </a:solidFill>
+          </a:ln>
+        </p:spPr>
+        <p:style>
+          <a:lnRef idx="0">
+            <a:scrgbClr r="0" g="0" b="0"/>
+          </a:lnRef>
+          <a:fillRef idx="0">
+            <a:scrgbClr r="0" g="0" b="0"/>
+          </a:fillRef>
+          <a:effectRef idx="0">
+            <a:scrgbClr r="0" g="0" b="0"/>
+          </a:effectRef>
+          <a:fontRef idx="minor">
+            <a:schemeClr val="lt1"/>
+          </a:fontRef>
+        </p:style>
+        <p:txBody>
+          <a:bodyPr rtlCol="0" anchor="ctr"/>
+          <a:lstStyle/>
+          <a:p>
+            <a:pPr algn="ctr"/>
+            <a:r>
+              <a:rPr lang="es-BO" dirty="0">
+                <a:solidFill>
+                  <a:schemeClr val="tx1"/>
+                </a:solidFill>
+              </a:rPr>
+              <a:t>Volumen</a:t>
+            </a:r>
+          </a:p>
+        </p:txBody>
+      </p:sp>
+      <p:sp>
+        <p:nvSpPr>
+          <p:cNvPr id="20" name="Rectangle 19">
+            <a:extLst>
+              <a:ext uri="{FF2B5EF4-FFF2-40B4-BE49-F238E27FC236}">
+                <a16:creationId xmlns:a16="http://schemas.microsoft.com/office/drawing/2014/main" id="{1A84C48B-0B82-4132-8224-DE3ABF2C4CAC}"/>
+              </a:ext>
+            </a:extLst>
+          </p:cNvPr>
+          <p:cNvSpPr/>
+          <p:nvPr/>
+        </p:nvSpPr>
+        <p:spPr>
+          <a:xfrm>
+            <a:off x="7006769" y="3588895"/>
+            <a:ext cx="1171462" cy="560389"/>
+          </a:xfrm>
+          <a:prstGeom prst="rect">
+            <a:avLst/>
+          </a:prstGeom>
+          <a:solidFill>
+            <a:schemeClr val="bg1"/>
+          </a:solidFill>
+          <a:ln>
+            <a:solidFill>
+              <a:schemeClr val="tx1"/>
+            </a:solidFill>
+          </a:ln>
+        </p:spPr>
+        <p:style>
+          <a:lnRef idx="0">
+            <a:scrgbClr r="0" g="0" b="0"/>
+          </a:lnRef>
+          <a:fillRef idx="0">
+            <a:scrgbClr r="0" g="0" b="0"/>
+          </a:fillRef>
+          <a:effectRef idx="0">
+            <a:scrgbClr r="0" g="0" b="0"/>
+          </a:effectRef>
+          <a:fontRef idx="minor">
+            <a:schemeClr val="lt1"/>
+          </a:fontRef>
+        </p:style>
+        <p:txBody>
+          <a:bodyPr rtlCol="0" anchor="ctr"/>
+          <a:lstStyle/>
+          <a:p>
+            <a:pPr algn="ctr"/>
+            <a:r>
+              <a:rPr lang="es-BO" dirty="0">
+                <a:solidFill>
+                  <a:schemeClr val="tx1"/>
+                </a:solidFill>
+              </a:rPr>
+              <a:t>Pausar el Juego</a:t>
+            </a:r>
+          </a:p>
+        </p:txBody>
+      </p:sp>
+      <p:sp>
+        <p:nvSpPr>
+          <p:cNvPr id="21" name="Rectangle 20">
+            <a:extLst>
+              <a:ext uri="{FF2B5EF4-FFF2-40B4-BE49-F238E27FC236}">
+                <a16:creationId xmlns:a16="http://schemas.microsoft.com/office/drawing/2014/main" id="{CD76F2FD-DA41-411B-875D-6B30C36D8DB6}"/>
+              </a:ext>
+            </a:extLst>
+          </p:cNvPr>
+          <p:cNvSpPr/>
+          <p:nvPr/>
+        </p:nvSpPr>
+        <p:spPr>
+          <a:xfrm>
+            <a:off x="4762946" y="4070240"/>
+            <a:ext cx="1322775" cy="280259"/>
+          </a:xfrm>
+          <a:prstGeom prst="rect">
+            <a:avLst/>
+          </a:prstGeom>
+          <a:solidFill>
+            <a:schemeClr val="bg1"/>
+          </a:solidFill>
+          <a:ln>
+            <a:solidFill>
+              <a:schemeClr val="tx1"/>
+            </a:solidFill>
+          </a:ln>
+        </p:spPr>
+        <p:style>
+          <a:lnRef idx="0">
+            <a:scrgbClr r="0" g="0" b="0"/>
+          </a:lnRef>
+          <a:fillRef idx="0">
+            <a:scrgbClr r="0" g="0" b="0"/>
+          </a:fillRef>
+          <a:effectRef idx="0">
+            <a:scrgbClr r="0" g="0" b="0"/>
+          </a:effectRef>
+          <a:fontRef idx="minor">
+            <a:schemeClr val="lt1"/>
+          </a:fontRef>
+        </p:style>
+        <p:txBody>
+          <a:bodyPr rtlCol="0" anchor="ctr"/>
+          <a:lstStyle/>
+          <a:p>
+            <a:pPr algn="ctr"/>
+            <a:r>
+              <a:rPr lang="es-BO" dirty="0">
+                <a:solidFill>
+                  <a:schemeClr val="tx1"/>
+                </a:solidFill>
+              </a:rPr>
+              <a:t>Resolución</a:t>
+            </a:r>
+          </a:p>
+        </p:txBody>
+      </p:sp>
+      <p:sp>
+        <p:nvSpPr>
+          <p:cNvPr id="22" name="Rectangle 21">
+            <a:extLst>
+              <a:ext uri="{FF2B5EF4-FFF2-40B4-BE49-F238E27FC236}">
+                <a16:creationId xmlns:a16="http://schemas.microsoft.com/office/drawing/2014/main" id="{6706F289-8A12-4C66-89EC-E3676234F2D0}"/>
+              </a:ext>
+            </a:extLst>
+          </p:cNvPr>
+          <p:cNvSpPr/>
+          <p:nvPr/>
+        </p:nvSpPr>
+        <p:spPr>
+          <a:xfrm>
+            <a:off x="3454659" y="4721751"/>
+            <a:ext cx="1069568" cy="652036"/>
+          </a:xfrm>
+          <a:prstGeom prst="rect">
+            <a:avLst/>
+          </a:prstGeom>
+          <a:solidFill>
+            <a:schemeClr val="bg1"/>
+          </a:solidFill>
+          <a:ln>
+            <a:solidFill>
+              <a:schemeClr val="tx1"/>
+            </a:solidFill>
+          </a:ln>
+        </p:spPr>
+        <p:style>
+          <a:lnRef idx="0">
+            <a:scrgbClr r="0" g="0" b="0"/>
+          </a:lnRef>
+          <a:fillRef idx="0">
+            <a:scrgbClr r="0" g="0" b="0"/>
+          </a:fillRef>
+          <a:effectRef idx="0">
+            <a:scrgbClr r="0" g="0" b="0"/>
+          </a:effectRef>
+          <a:fontRef idx="minor">
+            <a:schemeClr val="lt1"/>
+          </a:fontRef>
+        </p:style>
+        <p:txBody>
+          <a:bodyPr rtlCol="0" anchor="ctr"/>
+          <a:lstStyle/>
+          <a:p>
+            <a:pPr algn="ctr"/>
+            <a:r>
+              <a:rPr lang="es-BO" dirty="0">
+                <a:solidFill>
+                  <a:schemeClr val="tx1"/>
+                </a:solidFill>
+              </a:rPr>
+              <a:t>Editor de Mapas</a:t>
+            </a:r>
+          </a:p>
+        </p:txBody>
+      </p:sp>
+      <p:sp>
+        <p:nvSpPr>
+          <p:cNvPr id="23" name="Rectangle 22">
+            <a:extLst>
+              <a:ext uri="{FF2B5EF4-FFF2-40B4-BE49-F238E27FC236}">
+                <a16:creationId xmlns:a16="http://schemas.microsoft.com/office/drawing/2014/main" id="{955F529C-7B00-487B-825A-F0034314329B}"/>
+              </a:ext>
+            </a:extLst>
+          </p:cNvPr>
+          <p:cNvSpPr/>
+          <p:nvPr/>
+        </p:nvSpPr>
+        <p:spPr>
+          <a:xfrm>
+            <a:off x="416750" y="5841507"/>
+            <a:ext cx="2163640" cy="447236"/>
+          </a:xfrm>
+          <a:prstGeom prst="rect">
+            <a:avLst/>
+          </a:prstGeom>
+          <a:solidFill>
+            <a:schemeClr val="bg1"/>
+          </a:solidFill>
+          <a:ln>
+            <a:solidFill>
+              <a:schemeClr val="tx1"/>
+            </a:solidFill>
+          </a:ln>
+        </p:spPr>
+        <p:style>
+          <a:lnRef idx="0">
+            <a:scrgbClr r="0" g="0" b="0"/>
+          </a:lnRef>
+          <a:fillRef idx="0">
+            <a:scrgbClr r="0" g="0" b="0"/>
+          </a:fillRef>
+          <a:effectRef idx="0">
+            <a:scrgbClr r="0" g="0" b="0"/>
+          </a:effectRef>
+          <a:fontRef idx="minor">
+            <a:schemeClr val="lt1"/>
+          </a:fontRef>
+        </p:style>
+        <p:txBody>
+          <a:bodyPr rtlCol="0" anchor="ctr"/>
+          <a:lstStyle/>
+          <a:p>
+            <a:pPr algn="ctr"/>
+            <a:r>
+              <a:rPr lang="es-BO" dirty="0">
+                <a:solidFill>
+                  <a:schemeClr val="tx1"/>
+                </a:solidFill>
+              </a:rPr>
+              <a:t>Creador de Mapas</a:t>
+            </a:r>
           </a:p>
         </p:txBody>
       </p:sp>
       <p:cxnSp>
         <p:nvCxnSpPr>
-          <p:cNvPr id="11" name="Connector: Elbow 10">
-            <a:extLst>
-              <a:ext uri="{FF2B5EF4-FFF2-40B4-BE49-F238E27FC236}">
-                <a16:creationId xmlns:a16="http://schemas.microsoft.com/office/drawing/2014/main" id="{542A3388-BD50-4310-B7D0-B6264AA0442A}"/>
+          <p:cNvPr id="24" name="Connector: Elbow 23">
+            <a:extLst>
+              <a:ext uri="{FF2B5EF4-FFF2-40B4-BE49-F238E27FC236}">
+                <a16:creationId xmlns:a16="http://schemas.microsoft.com/office/drawing/2014/main" id="{148390D7-8012-4434-A905-35E8C1B8BFD7}"/>
               </a:ext>
             </a:extLst>
           </p:cNvPr>
           <p:cNvCxnSpPr>
             <a:cxnSpLocks/>
-            <a:endCxn id="5" idx="2"/>
+            <a:stCxn id="23" idx="0"/>
           </p:cNvCxnSpPr>
           <p:nvPr/>
         </p:nvCxnSpPr>
         <p:spPr>
-          <a:xfrm rot="10800000">
-            <a:off x="1560714" y="1438014"/>
-            <a:ext cx="1894868" cy="915449"/>
+          <a:xfrm rot="5400000" flipH="1" flipV="1">
+            <a:off x="2082022" y="4467943"/>
+            <a:ext cx="790113" cy="1957017"/>
           </a:xfrm>
           <a:prstGeom prst="bentConnector2">
             <a:avLst/>
@@ -3658,52 +4304,116 @@
           </a:fontRef>
         </p:style>
       </p:cxnSp>
-      <p:cxnSp>
-        <p:nvCxnSpPr>
-          <p:cNvPr id="15" name="Connector: Elbow 14">
-            <a:extLst>
-              <a:ext uri="{FF2B5EF4-FFF2-40B4-BE49-F238E27FC236}">
-                <a16:creationId xmlns:a16="http://schemas.microsoft.com/office/drawing/2014/main" id="{EA3CB09A-4779-43A7-A256-260F4D9D0E36}"/>
-              </a:ext>
-            </a:extLst>
-          </p:cNvPr>
-          <p:cNvCxnSpPr>
-            <a:cxnSpLocks/>
-            <a:endCxn id="6" idx="0"/>
-          </p:cNvCxnSpPr>
+      <p:sp>
+        <p:nvSpPr>
+          <p:cNvPr id="27" name="TextBox 26">
+            <a:extLst>
+              <a:ext uri="{FF2B5EF4-FFF2-40B4-BE49-F238E27FC236}">
+                <a16:creationId xmlns:a16="http://schemas.microsoft.com/office/drawing/2014/main" id="{1A518544-52BA-4FEF-8B4C-BC9BDAC7B410}"/>
+              </a:ext>
+            </a:extLst>
+          </p:cNvPr>
+          <p:cNvSpPr txBox="1"/>
           <p:nvPr/>
-        </p:nvCxnSpPr>
+        </p:nvSpPr>
         <p:spPr>
-          <a:xfrm rot="10800000" flipV="1">
-            <a:off x="1560715" y="4488809"/>
-            <a:ext cx="1894867" cy="798268"/>
+          <a:xfrm>
+            <a:off x="4537407" y="4878772"/>
+            <a:ext cx="1957017" cy="369332"/>
           </a:xfrm>
-          <a:prstGeom prst="bentConnector2">
+          <a:prstGeom prst="rect">
+            <a:avLst/>
+          </a:prstGeom>
+        </p:spPr>
+        <p:style>
+          <a:lnRef idx="2">
+            <a:schemeClr val="dk1"/>
+          </a:lnRef>
+          <a:fillRef idx="1">
+            <a:schemeClr val="lt1"/>
+          </a:fillRef>
+          <a:effectRef idx="0">
+            <a:schemeClr val="dk1"/>
+          </a:effectRef>
+          <a:fontRef idx="minor">
+            <a:schemeClr val="dk1"/>
+          </a:fontRef>
+        </p:style>
+        <p:txBody>
+          <a:bodyPr wrap="square" rtlCol="0">
+            <a:spAutoFit/>
+          </a:bodyPr>
+          <a:lstStyle/>
+          <a:p>
+            <a:pPr algn="ctr"/>
+            <a:r>
+              <a:rPr lang="es-BO" dirty="0"/>
+              <a:t>Añadir Tiempo</a:t>
+            </a:r>
+          </a:p>
+        </p:txBody>
+      </p:sp>
+      <p:sp>
+        <p:nvSpPr>
+          <p:cNvPr id="3" name="Oval 2">
+            <a:extLst>
+              <a:ext uri="{FF2B5EF4-FFF2-40B4-BE49-F238E27FC236}">
+                <a16:creationId xmlns:a16="http://schemas.microsoft.com/office/drawing/2014/main" id="{FD74F58D-021E-401F-BE27-F6C0238258E1}"/>
+              </a:ext>
+            </a:extLst>
+          </p:cNvPr>
+          <p:cNvSpPr/>
+          <p:nvPr/>
+        </p:nvSpPr>
+        <p:spPr>
+          <a:xfrm>
+            <a:off x="8301779" y="1191310"/>
+            <a:ext cx="1411232" cy="1247090"/>
+          </a:xfrm>
+          <a:prstGeom prst="ellipse">
             <a:avLst/>
           </a:prstGeom>
           <a:ln>
-            <a:tailEnd type="triangle"/>
+            <a:solidFill>
+              <a:schemeClr val="tx1"/>
+            </a:solidFill>
           </a:ln>
         </p:spPr>
         <p:style>
-          <a:lnRef idx="1">
-            <a:schemeClr val="accent1"/>
+          <a:lnRef idx="2">
+            <a:schemeClr val="accent6"/>
           </a:lnRef>
-          <a:fillRef idx="0">
-            <a:schemeClr val="accent1"/>
+          <a:fillRef idx="1">
+            <a:schemeClr val="lt1"/>
           </a:fillRef>
           <a:effectRef idx="0">
-            <a:schemeClr val="accent1"/>
+            <a:schemeClr val="accent6"/>
           </a:effectRef>
           <a:fontRef idx="minor">
-            <a:schemeClr val="tx1"/>
+            <a:schemeClr val="dk1"/>
           </a:fontRef>
         </p:style>
-      </p:cxnSp>
+        <p:txBody>
+          <a:bodyPr rtlCol="0" anchor="ctr"/>
+          <a:lstStyle/>
+          <a:p>
+            <a:pPr algn="ctr"/>
+            <a:r>
+              <a:rPr lang="es-BO" sz="2000" dirty="0"/>
+              <a:t>Pose </a:t>
+            </a:r>
+            <a:r>
+              <a:rPr lang="es-BO" sz="2000" dirty="0" err="1"/>
+              <a:t>it!</a:t>
+            </a:r>
+            <a:endParaRPr lang="es-BO" sz="2000" dirty="0"/>
+          </a:p>
+        </p:txBody>
+      </p:sp>
     </p:spTree>
     <p:extLst>
       <p:ext uri="{BB962C8B-B14F-4D97-AF65-F5344CB8AC3E}">
-        <p14:creationId xmlns:p14="http://schemas.microsoft.com/office/powerpoint/2010/main" val="3756922906"/>
+        <p14:creationId xmlns:p14="http://schemas.microsoft.com/office/powerpoint/2010/main" val="3407441589"/>
       </p:ext>
     </p:extLst>
   </p:cSld>

</xml_diff>

<commit_message>
Avance en como se llama, ah si, Redactar Diseño
</commit_message>
<xml_diff>
--- a/Informe/Images/MVP.pptx
+++ b/Informe/Images/MVP.pptx
@@ -6,6 +6,7 @@
   </p:sldMasterIdLst>
   <p:sldIdLst>
     <p:sldId id="257" r:id="rId2"/>
+    <p:sldId id="258" r:id="rId3"/>
   </p:sldIdLst>
   <p:sldSz cx="12192000" cy="6858000"/>
   <p:notesSz cx="6858000" cy="9144000"/>
@@ -261,7 +262,7 @@
           <a:p>
             <a:fld id="{9393FD87-CB66-4628-A0CB-CD2678E0D5AC}" type="datetimeFigureOut">
               <a:rPr lang="es-BO" smtClean="0"/>
-              <a:t>8/12/2020</a:t>
+              <a:t>11/12/2020</a:t>
             </a:fld>
             <a:endParaRPr lang="es-BO"/>
           </a:p>
@@ -461,7 +462,7 @@
           <a:p>
             <a:fld id="{9393FD87-CB66-4628-A0CB-CD2678E0D5AC}" type="datetimeFigureOut">
               <a:rPr lang="es-BO" smtClean="0"/>
-              <a:t>8/12/2020</a:t>
+              <a:t>11/12/2020</a:t>
             </a:fld>
             <a:endParaRPr lang="es-BO"/>
           </a:p>
@@ -671,7 +672,7 @@
           <a:p>
             <a:fld id="{9393FD87-CB66-4628-A0CB-CD2678E0D5AC}" type="datetimeFigureOut">
               <a:rPr lang="es-BO" smtClean="0"/>
-              <a:t>8/12/2020</a:t>
+              <a:t>11/12/2020</a:t>
             </a:fld>
             <a:endParaRPr lang="es-BO"/>
           </a:p>
@@ -871,7 +872,7 @@
           <a:p>
             <a:fld id="{9393FD87-CB66-4628-A0CB-CD2678E0D5AC}" type="datetimeFigureOut">
               <a:rPr lang="es-BO" smtClean="0"/>
-              <a:t>8/12/2020</a:t>
+              <a:t>11/12/2020</a:t>
             </a:fld>
             <a:endParaRPr lang="es-BO"/>
           </a:p>
@@ -1147,7 +1148,7 @@
           <a:p>
             <a:fld id="{9393FD87-CB66-4628-A0CB-CD2678E0D5AC}" type="datetimeFigureOut">
               <a:rPr lang="es-BO" smtClean="0"/>
-              <a:t>8/12/2020</a:t>
+              <a:t>11/12/2020</a:t>
             </a:fld>
             <a:endParaRPr lang="es-BO"/>
           </a:p>
@@ -1415,7 +1416,7 @@
           <a:p>
             <a:fld id="{9393FD87-CB66-4628-A0CB-CD2678E0D5AC}" type="datetimeFigureOut">
               <a:rPr lang="es-BO" smtClean="0"/>
-              <a:t>8/12/2020</a:t>
+              <a:t>11/12/2020</a:t>
             </a:fld>
             <a:endParaRPr lang="es-BO"/>
           </a:p>
@@ -1830,7 +1831,7 @@
           <a:p>
             <a:fld id="{9393FD87-CB66-4628-A0CB-CD2678E0D5AC}" type="datetimeFigureOut">
               <a:rPr lang="es-BO" smtClean="0"/>
-              <a:t>8/12/2020</a:t>
+              <a:t>11/12/2020</a:t>
             </a:fld>
             <a:endParaRPr lang="es-BO"/>
           </a:p>
@@ -1972,7 +1973,7 @@
           <a:p>
             <a:fld id="{9393FD87-CB66-4628-A0CB-CD2678E0D5AC}" type="datetimeFigureOut">
               <a:rPr lang="es-BO" smtClean="0"/>
-              <a:t>8/12/2020</a:t>
+              <a:t>11/12/2020</a:t>
             </a:fld>
             <a:endParaRPr lang="es-BO"/>
           </a:p>
@@ -2085,7 +2086,7 @@
           <a:p>
             <a:fld id="{9393FD87-CB66-4628-A0CB-CD2678E0D5AC}" type="datetimeFigureOut">
               <a:rPr lang="es-BO" smtClean="0"/>
-              <a:t>8/12/2020</a:t>
+              <a:t>11/12/2020</a:t>
             </a:fld>
             <a:endParaRPr lang="es-BO"/>
           </a:p>
@@ -2398,7 +2399,7 @@
           <a:p>
             <a:fld id="{9393FD87-CB66-4628-A0CB-CD2678E0D5AC}" type="datetimeFigureOut">
               <a:rPr lang="es-BO" smtClean="0"/>
-              <a:t>8/12/2020</a:t>
+              <a:t>11/12/2020</a:t>
             </a:fld>
             <a:endParaRPr lang="es-BO"/>
           </a:p>
@@ -2687,7 +2688,7 @@
           <a:p>
             <a:fld id="{9393FD87-CB66-4628-A0CB-CD2678E0D5AC}" type="datetimeFigureOut">
               <a:rPr lang="es-BO" smtClean="0"/>
-              <a:t>8/12/2020</a:t>
+              <a:t>11/12/2020</a:t>
             </a:fld>
             <a:endParaRPr lang="es-BO"/>
           </a:p>
@@ -2930,7 +2931,7 @@
           <a:p>
             <a:fld id="{9393FD87-CB66-4628-A0CB-CD2678E0D5AC}" type="datetimeFigureOut">
               <a:rPr lang="es-BO" smtClean="0"/>
-              <a:t>8/12/2020</a:t>
+              <a:t>11/12/2020</a:t>
             </a:fld>
             <a:endParaRPr lang="es-BO"/>
           </a:p>
@@ -4423,6 +4424,1040 @@
 </p:sld>
 </file>
 
+<file path=ppt/slides/slide2.xml><?xml version="1.0" encoding="utf-8"?>
+<p:sld xmlns:a="http://schemas.openxmlformats.org/drawingml/2006/main" xmlns:r="http://schemas.openxmlformats.org/officeDocument/2006/relationships" xmlns:p="http://schemas.openxmlformats.org/presentationml/2006/main">
+  <p:cSld>
+    <p:spTree>
+      <p:nvGrpSpPr>
+        <p:cNvPr id="1" name=""/>
+        <p:cNvGrpSpPr/>
+        <p:nvPr/>
+      </p:nvGrpSpPr>
+      <p:grpSpPr>
+        <a:xfrm>
+          <a:off x="0" y="0"/>
+          <a:ext cx="0" cy="0"/>
+          <a:chOff x="0" y="0"/>
+          <a:chExt cx="0" cy="0"/>
+        </a:xfrm>
+      </p:grpSpPr>
+      <p:sp>
+        <p:nvSpPr>
+          <p:cNvPr id="4" name="Rectangle 3">
+            <a:extLst>
+              <a:ext uri="{FF2B5EF4-FFF2-40B4-BE49-F238E27FC236}">
+                <a16:creationId xmlns:a16="http://schemas.microsoft.com/office/drawing/2014/main" id="{2DA9C801-17C0-4333-B283-085D799155A0}"/>
+              </a:ext>
+            </a:extLst>
+          </p:cNvPr>
+          <p:cNvSpPr/>
+          <p:nvPr/>
+        </p:nvSpPr>
+        <p:spPr>
+          <a:xfrm>
+            <a:off x="664127" y="1973510"/>
+            <a:ext cx="1208015" cy="914400"/>
+          </a:xfrm>
+          <a:prstGeom prst="rect">
+            <a:avLst/>
+          </a:prstGeom>
+          <a:solidFill>
+            <a:schemeClr val="bg1"/>
+          </a:solidFill>
+          <a:ln>
+            <a:solidFill>
+              <a:schemeClr val="tx1"/>
+            </a:solidFill>
+          </a:ln>
+        </p:spPr>
+        <p:style>
+          <a:lnRef idx="2">
+            <a:schemeClr val="dk1">
+              <a:shade val="50000"/>
+            </a:schemeClr>
+          </a:lnRef>
+          <a:fillRef idx="1">
+            <a:schemeClr val="dk1"/>
+          </a:fillRef>
+          <a:effectRef idx="0">
+            <a:schemeClr val="dk1"/>
+          </a:effectRef>
+          <a:fontRef idx="minor">
+            <a:schemeClr val="lt1"/>
+          </a:fontRef>
+        </p:style>
+        <p:txBody>
+          <a:bodyPr rtlCol="0" anchor="ctr"/>
+          <a:lstStyle/>
+          <a:p>
+            <a:pPr algn="ctr"/>
+            <a:r>
+              <a:rPr lang="es-BO" sz="1600" dirty="0">
+                <a:solidFill>
+                  <a:schemeClr val="tx1"/>
+                </a:solidFill>
+              </a:rPr>
+              <a:t>1: Vídeo</a:t>
+            </a:r>
+          </a:p>
+        </p:txBody>
+      </p:sp>
+      <p:sp>
+        <p:nvSpPr>
+          <p:cNvPr id="5" name="Rectangle 4">
+            <a:extLst>
+              <a:ext uri="{FF2B5EF4-FFF2-40B4-BE49-F238E27FC236}">
+                <a16:creationId xmlns:a16="http://schemas.microsoft.com/office/drawing/2014/main" id="{8D476011-F416-4F5F-A415-83BA03023CB6}"/>
+              </a:ext>
+            </a:extLst>
+          </p:cNvPr>
+          <p:cNvSpPr/>
+          <p:nvPr/>
+        </p:nvSpPr>
+        <p:spPr>
+          <a:xfrm>
+            <a:off x="2199313" y="1059110"/>
+            <a:ext cx="1208015" cy="914400"/>
+          </a:xfrm>
+          <a:prstGeom prst="rect">
+            <a:avLst/>
+          </a:prstGeom>
+          <a:solidFill>
+            <a:schemeClr val="bg1"/>
+          </a:solidFill>
+          <a:ln>
+            <a:solidFill>
+              <a:schemeClr val="tx1"/>
+            </a:solidFill>
+          </a:ln>
+        </p:spPr>
+        <p:style>
+          <a:lnRef idx="2">
+            <a:schemeClr val="dk1">
+              <a:shade val="50000"/>
+            </a:schemeClr>
+          </a:lnRef>
+          <a:fillRef idx="1">
+            <a:schemeClr val="dk1"/>
+          </a:fillRef>
+          <a:effectRef idx="0">
+            <a:schemeClr val="dk1"/>
+          </a:effectRef>
+          <a:fontRef idx="minor">
+            <a:schemeClr val="lt1"/>
+          </a:fontRef>
+        </p:style>
+        <p:txBody>
+          <a:bodyPr rtlCol="0" anchor="ctr"/>
+          <a:lstStyle/>
+          <a:p>
+            <a:pPr algn="ctr"/>
+            <a:r>
+              <a:rPr lang="es-BO" sz="1600" dirty="0">
+                <a:solidFill>
+                  <a:schemeClr val="tx1"/>
+                </a:solidFill>
+              </a:rPr>
+              <a:t>2: JSON</a:t>
+            </a:r>
+          </a:p>
+        </p:txBody>
+      </p:sp>
+      <p:sp>
+        <p:nvSpPr>
+          <p:cNvPr id="6" name="Rectangle 5">
+            <a:extLst>
+              <a:ext uri="{FF2B5EF4-FFF2-40B4-BE49-F238E27FC236}">
+                <a16:creationId xmlns:a16="http://schemas.microsoft.com/office/drawing/2014/main" id="{DECCA59C-DE07-42E3-963B-5E5F17D2AA8B}"/>
+              </a:ext>
+            </a:extLst>
+          </p:cNvPr>
+          <p:cNvSpPr/>
+          <p:nvPr/>
+        </p:nvSpPr>
+        <p:spPr>
+          <a:xfrm>
+            <a:off x="2199313" y="2887910"/>
+            <a:ext cx="1208015" cy="914400"/>
+          </a:xfrm>
+          <a:prstGeom prst="rect">
+            <a:avLst/>
+          </a:prstGeom>
+          <a:solidFill>
+            <a:schemeClr val="bg1"/>
+          </a:solidFill>
+          <a:ln>
+            <a:solidFill>
+              <a:schemeClr val="tx1"/>
+            </a:solidFill>
+          </a:ln>
+        </p:spPr>
+        <p:style>
+          <a:lnRef idx="2">
+            <a:schemeClr val="dk1">
+              <a:shade val="50000"/>
+            </a:schemeClr>
+          </a:lnRef>
+          <a:fillRef idx="1">
+            <a:schemeClr val="dk1"/>
+          </a:fillRef>
+          <a:effectRef idx="0">
+            <a:schemeClr val="dk1"/>
+          </a:effectRef>
+          <a:fontRef idx="minor">
+            <a:schemeClr val="lt1"/>
+          </a:fontRef>
+        </p:style>
+        <p:txBody>
+          <a:bodyPr rtlCol="0" anchor="ctr"/>
+          <a:lstStyle/>
+          <a:p>
+            <a:pPr algn="ctr"/>
+            <a:r>
+              <a:rPr lang="es-BO" sz="1600" dirty="0">
+                <a:solidFill>
+                  <a:schemeClr val="tx1"/>
+                </a:solidFill>
+              </a:rPr>
+              <a:t>2: JPG</a:t>
+            </a:r>
+          </a:p>
+        </p:txBody>
+      </p:sp>
+      <p:sp>
+        <p:nvSpPr>
+          <p:cNvPr id="7" name="Rectangle 6">
+            <a:extLst>
+              <a:ext uri="{FF2B5EF4-FFF2-40B4-BE49-F238E27FC236}">
+                <a16:creationId xmlns:a16="http://schemas.microsoft.com/office/drawing/2014/main" id="{B1A92854-3D6C-4789-80B8-EAED115F9467}"/>
+              </a:ext>
+            </a:extLst>
+          </p:cNvPr>
+          <p:cNvSpPr/>
+          <p:nvPr/>
+        </p:nvSpPr>
+        <p:spPr>
+          <a:xfrm>
+            <a:off x="5269688" y="1973510"/>
+            <a:ext cx="1208015" cy="914400"/>
+          </a:xfrm>
+          <a:prstGeom prst="rect">
+            <a:avLst/>
+          </a:prstGeom>
+          <a:solidFill>
+            <a:schemeClr val="bg1"/>
+          </a:solidFill>
+          <a:ln>
+            <a:solidFill>
+              <a:schemeClr val="tx1"/>
+            </a:solidFill>
+          </a:ln>
+        </p:spPr>
+        <p:style>
+          <a:lnRef idx="2">
+            <a:schemeClr val="dk1">
+              <a:shade val="50000"/>
+            </a:schemeClr>
+          </a:lnRef>
+          <a:fillRef idx="1">
+            <a:schemeClr val="dk1"/>
+          </a:fillRef>
+          <a:effectRef idx="0">
+            <a:schemeClr val="dk1"/>
+          </a:effectRef>
+          <a:fontRef idx="minor">
+            <a:schemeClr val="lt1"/>
+          </a:fontRef>
+        </p:style>
+        <p:txBody>
+          <a:bodyPr rtlCol="0" anchor="ctr"/>
+          <a:lstStyle/>
+          <a:p>
+            <a:pPr algn="ctr"/>
+            <a:r>
+              <a:rPr lang="es-BO" sz="1600" dirty="0">
+                <a:solidFill>
+                  <a:schemeClr val="tx1"/>
+                </a:solidFill>
+              </a:rPr>
+              <a:t>4: .txt</a:t>
+            </a:r>
+          </a:p>
+        </p:txBody>
+      </p:sp>
+      <p:sp>
+        <p:nvSpPr>
+          <p:cNvPr id="8" name="Rectangle 7">
+            <a:extLst>
+              <a:ext uri="{FF2B5EF4-FFF2-40B4-BE49-F238E27FC236}">
+                <a16:creationId xmlns:a16="http://schemas.microsoft.com/office/drawing/2014/main" id="{51D9BAC8-C328-49C2-AFEF-A1DDD45A231D}"/>
+              </a:ext>
+            </a:extLst>
+          </p:cNvPr>
+          <p:cNvSpPr/>
+          <p:nvPr/>
+        </p:nvSpPr>
+        <p:spPr>
+          <a:xfrm>
+            <a:off x="4502092" y="3173135"/>
+            <a:ext cx="1208015" cy="914400"/>
+          </a:xfrm>
+          <a:prstGeom prst="rect">
+            <a:avLst/>
+          </a:prstGeom>
+          <a:solidFill>
+            <a:schemeClr val="bg1"/>
+          </a:solidFill>
+          <a:ln>
+            <a:solidFill>
+              <a:schemeClr val="tx1"/>
+            </a:solidFill>
+          </a:ln>
+        </p:spPr>
+        <p:style>
+          <a:lnRef idx="2">
+            <a:schemeClr val="dk1">
+              <a:shade val="50000"/>
+            </a:schemeClr>
+          </a:lnRef>
+          <a:fillRef idx="1">
+            <a:schemeClr val="dk1"/>
+          </a:fillRef>
+          <a:effectRef idx="0">
+            <a:schemeClr val="dk1"/>
+          </a:effectRef>
+          <a:fontRef idx="minor">
+            <a:schemeClr val="lt1"/>
+          </a:fontRef>
+        </p:style>
+        <p:txBody>
+          <a:bodyPr rtlCol="0" anchor="ctr"/>
+          <a:lstStyle/>
+          <a:p>
+            <a:pPr algn="ctr"/>
+            <a:r>
+              <a:rPr lang="es-BO" sz="1600" dirty="0">
+                <a:solidFill>
+                  <a:schemeClr val="tx1"/>
+                </a:solidFill>
+              </a:rPr>
+              <a:t>Normalizar</a:t>
+            </a:r>
+          </a:p>
+        </p:txBody>
+      </p:sp>
+      <p:sp>
+        <p:nvSpPr>
+          <p:cNvPr id="9" name="Rectangle 8">
+            <a:extLst>
+              <a:ext uri="{FF2B5EF4-FFF2-40B4-BE49-F238E27FC236}">
+                <a16:creationId xmlns:a16="http://schemas.microsoft.com/office/drawing/2014/main" id="{07FBFCA2-C299-4B85-BBA2-F868BDFE10BB}"/>
+              </a:ext>
+            </a:extLst>
+          </p:cNvPr>
+          <p:cNvSpPr/>
+          <p:nvPr/>
+        </p:nvSpPr>
+        <p:spPr>
+          <a:xfrm>
+            <a:off x="3734498" y="1973510"/>
+            <a:ext cx="1208015" cy="914400"/>
+          </a:xfrm>
+          <a:prstGeom prst="rect">
+            <a:avLst/>
+          </a:prstGeom>
+          <a:solidFill>
+            <a:schemeClr val="bg1"/>
+          </a:solidFill>
+          <a:ln>
+            <a:solidFill>
+              <a:schemeClr val="tx1"/>
+            </a:solidFill>
+          </a:ln>
+        </p:spPr>
+        <p:style>
+          <a:lnRef idx="2">
+            <a:schemeClr val="dk1">
+              <a:shade val="50000"/>
+            </a:schemeClr>
+          </a:lnRef>
+          <a:fillRef idx="1">
+            <a:schemeClr val="dk1"/>
+          </a:fillRef>
+          <a:effectRef idx="0">
+            <a:schemeClr val="dk1"/>
+          </a:effectRef>
+          <a:fontRef idx="minor">
+            <a:schemeClr val="lt1"/>
+          </a:fontRef>
+        </p:style>
+        <p:txBody>
+          <a:bodyPr rtlCol="0" anchor="ctr"/>
+          <a:lstStyle/>
+          <a:p>
+            <a:pPr algn="ctr"/>
+            <a:r>
+              <a:rPr lang="es-BO" sz="1600" dirty="0">
+                <a:solidFill>
+                  <a:schemeClr val="tx1"/>
+                </a:solidFill>
+              </a:rPr>
+              <a:t>3: Eliminar Poses</a:t>
+            </a:r>
+          </a:p>
+        </p:txBody>
+      </p:sp>
+      <p:sp>
+        <p:nvSpPr>
+          <p:cNvPr id="10" name="Rectangle 9">
+            <a:extLst>
+              <a:ext uri="{FF2B5EF4-FFF2-40B4-BE49-F238E27FC236}">
+                <a16:creationId xmlns:a16="http://schemas.microsoft.com/office/drawing/2014/main" id="{42C18BF8-498B-44ED-92F9-15B4530EC240}"/>
+              </a:ext>
+            </a:extLst>
+          </p:cNvPr>
+          <p:cNvSpPr/>
+          <p:nvPr/>
+        </p:nvSpPr>
+        <p:spPr>
+          <a:xfrm>
+            <a:off x="6804870" y="1059110"/>
+            <a:ext cx="1208015" cy="914400"/>
+          </a:xfrm>
+          <a:prstGeom prst="rect">
+            <a:avLst/>
+          </a:prstGeom>
+          <a:solidFill>
+            <a:schemeClr val="bg1"/>
+          </a:solidFill>
+          <a:ln>
+            <a:solidFill>
+              <a:schemeClr val="tx1"/>
+            </a:solidFill>
+          </a:ln>
+        </p:spPr>
+        <p:style>
+          <a:lnRef idx="2">
+            <a:schemeClr val="dk1">
+              <a:shade val="50000"/>
+            </a:schemeClr>
+          </a:lnRef>
+          <a:fillRef idx="1">
+            <a:schemeClr val="dk1"/>
+          </a:fillRef>
+          <a:effectRef idx="0">
+            <a:schemeClr val="dk1"/>
+          </a:effectRef>
+          <a:fontRef idx="minor">
+            <a:schemeClr val="lt1"/>
+          </a:fontRef>
+        </p:style>
+        <p:txBody>
+          <a:bodyPr rtlCol="0" anchor="ctr"/>
+          <a:lstStyle/>
+          <a:p>
+            <a:pPr algn="ctr"/>
+            <a:r>
+              <a:rPr lang="es-BO" sz="1600" dirty="0">
+                <a:solidFill>
+                  <a:schemeClr val="tx1"/>
+                </a:solidFill>
+              </a:rPr>
+              <a:t>5: Un .txt</a:t>
+            </a:r>
+          </a:p>
+        </p:txBody>
+      </p:sp>
+      <p:sp>
+        <p:nvSpPr>
+          <p:cNvPr id="11" name="Rectangle 10">
+            <a:extLst>
+              <a:ext uri="{FF2B5EF4-FFF2-40B4-BE49-F238E27FC236}">
+                <a16:creationId xmlns:a16="http://schemas.microsoft.com/office/drawing/2014/main" id="{67CCC59F-B6F1-49E7-BE68-8AE4E75F146E}"/>
+              </a:ext>
+            </a:extLst>
+          </p:cNvPr>
+          <p:cNvSpPr/>
+          <p:nvPr/>
+        </p:nvSpPr>
+        <p:spPr>
+          <a:xfrm>
+            <a:off x="6804871" y="2887910"/>
+            <a:ext cx="1208015" cy="914400"/>
+          </a:xfrm>
+          <a:prstGeom prst="rect">
+            <a:avLst/>
+          </a:prstGeom>
+          <a:solidFill>
+            <a:schemeClr val="bg1"/>
+          </a:solidFill>
+          <a:ln>
+            <a:solidFill>
+              <a:schemeClr val="tx1"/>
+            </a:solidFill>
+          </a:ln>
+        </p:spPr>
+        <p:style>
+          <a:lnRef idx="2">
+            <a:schemeClr val="dk1">
+              <a:shade val="50000"/>
+            </a:schemeClr>
+          </a:lnRef>
+          <a:fillRef idx="1">
+            <a:schemeClr val="dk1"/>
+          </a:fillRef>
+          <a:effectRef idx="0">
+            <a:schemeClr val="dk1"/>
+          </a:effectRef>
+          <a:fontRef idx="minor">
+            <a:schemeClr val="lt1"/>
+          </a:fontRef>
+        </p:style>
+        <p:txBody>
+          <a:bodyPr rtlCol="0" anchor="ctr"/>
+          <a:lstStyle/>
+          <a:p>
+            <a:pPr algn="ctr"/>
+            <a:r>
+              <a:rPr lang="es-BO" sz="1600" dirty="0">
+                <a:solidFill>
+                  <a:schemeClr val="tx1"/>
+                </a:solidFill>
+              </a:rPr>
+              <a:t>5: Múltiples .txt</a:t>
+            </a:r>
+          </a:p>
+        </p:txBody>
+      </p:sp>
+      <p:sp>
+        <p:nvSpPr>
+          <p:cNvPr id="12" name="Rectangle 11">
+            <a:extLst>
+              <a:ext uri="{FF2B5EF4-FFF2-40B4-BE49-F238E27FC236}">
+                <a16:creationId xmlns:a16="http://schemas.microsoft.com/office/drawing/2014/main" id="{5E9BAB5D-6BD0-4A2D-8BC9-6D1E8797E58D}"/>
+              </a:ext>
+            </a:extLst>
+          </p:cNvPr>
+          <p:cNvSpPr/>
+          <p:nvPr/>
+        </p:nvSpPr>
+        <p:spPr>
+          <a:xfrm>
+            <a:off x="8340052" y="2887910"/>
+            <a:ext cx="1208015" cy="914400"/>
+          </a:xfrm>
+          <a:prstGeom prst="rect">
+            <a:avLst/>
+          </a:prstGeom>
+          <a:solidFill>
+            <a:schemeClr val="bg1"/>
+          </a:solidFill>
+          <a:ln>
+            <a:solidFill>
+              <a:schemeClr val="tx1"/>
+            </a:solidFill>
+          </a:ln>
+        </p:spPr>
+        <p:style>
+          <a:lnRef idx="2">
+            <a:schemeClr val="dk1">
+              <a:shade val="50000"/>
+            </a:schemeClr>
+          </a:lnRef>
+          <a:fillRef idx="1">
+            <a:schemeClr val="dk1"/>
+          </a:fillRef>
+          <a:effectRef idx="0">
+            <a:schemeClr val="dk1"/>
+          </a:effectRef>
+          <a:fontRef idx="minor">
+            <a:schemeClr val="lt1"/>
+          </a:fontRef>
+        </p:style>
+        <p:txBody>
+          <a:bodyPr rtlCol="0" anchor="ctr"/>
+          <a:lstStyle/>
+          <a:p>
+            <a:pPr algn="ctr"/>
+            <a:r>
+              <a:rPr lang="es-BO" sz="1400" dirty="0">
+                <a:solidFill>
+                  <a:schemeClr val="tx1"/>
+                </a:solidFill>
+              </a:rPr>
+              <a:t>6: Calificación por Frames</a:t>
+            </a:r>
+          </a:p>
+        </p:txBody>
+      </p:sp>
+      <p:sp>
+        <p:nvSpPr>
+          <p:cNvPr id="13" name="Rectangle 12">
+            <a:extLst>
+              <a:ext uri="{FF2B5EF4-FFF2-40B4-BE49-F238E27FC236}">
+                <a16:creationId xmlns:a16="http://schemas.microsoft.com/office/drawing/2014/main" id="{F743095B-7448-4B08-8B3C-D009787F3961}"/>
+              </a:ext>
+            </a:extLst>
+          </p:cNvPr>
+          <p:cNvSpPr/>
+          <p:nvPr/>
+        </p:nvSpPr>
+        <p:spPr>
+          <a:xfrm>
+            <a:off x="8340052" y="1059110"/>
+            <a:ext cx="1208015" cy="914400"/>
+          </a:xfrm>
+          <a:prstGeom prst="rect">
+            <a:avLst/>
+          </a:prstGeom>
+          <a:solidFill>
+            <a:schemeClr val="bg1"/>
+          </a:solidFill>
+          <a:ln>
+            <a:solidFill>
+              <a:schemeClr val="tx1"/>
+            </a:solidFill>
+          </a:ln>
+        </p:spPr>
+        <p:style>
+          <a:lnRef idx="2">
+            <a:schemeClr val="dk1">
+              <a:shade val="50000"/>
+            </a:schemeClr>
+          </a:lnRef>
+          <a:fillRef idx="1">
+            <a:schemeClr val="dk1"/>
+          </a:fillRef>
+          <a:effectRef idx="0">
+            <a:schemeClr val="dk1"/>
+          </a:effectRef>
+          <a:fontRef idx="minor">
+            <a:schemeClr val="lt1"/>
+          </a:fontRef>
+        </p:style>
+        <p:txBody>
+          <a:bodyPr rtlCol="0" anchor="ctr"/>
+          <a:lstStyle/>
+          <a:p>
+            <a:pPr algn="ctr"/>
+            <a:r>
+              <a:rPr lang="es-BO" sz="1400" dirty="0">
+                <a:solidFill>
+                  <a:schemeClr val="tx1"/>
+                </a:solidFill>
+              </a:rPr>
+              <a:t>6: Calificación por Límite de Tiempo</a:t>
+            </a:r>
+          </a:p>
+        </p:txBody>
+      </p:sp>
+      <p:cxnSp>
+        <p:nvCxnSpPr>
+          <p:cNvPr id="19" name="Connector: Elbow 18">
+            <a:extLst>
+              <a:ext uri="{FF2B5EF4-FFF2-40B4-BE49-F238E27FC236}">
+                <a16:creationId xmlns:a16="http://schemas.microsoft.com/office/drawing/2014/main" id="{0B5E59B5-A6A5-444F-BFBE-11CC80562AD1}"/>
+              </a:ext>
+            </a:extLst>
+          </p:cNvPr>
+          <p:cNvCxnSpPr>
+            <a:stCxn id="4" idx="3"/>
+            <a:endCxn id="5" idx="2"/>
+          </p:cNvCxnSpPr>
+          <p:nvPr/>
+        </p:nvCxnSpPr>
+        <p:spPr>
+          <a:xfrm flipV="1">
+            <a:off x="1872142" y="1973510"/>
+            <a:ext cx="931179" cy="457200"/>
+          </a:xfrm>
+          <a:prstGeom prst="bentConnector2">
+            <a:avLst/>
+          </a:prstGeom>
+          <a:ln>
+            <a:tailEnd type="triangle"/>
+          </a:ln>
+        </p:spPr>
+        <p:style>
+          <a:lnRef idx="1">
+            <a:schemeClr val="accent1"/>
+          </a:lnRef>
+          <a:fillRef idx="0">
+            <a:schemeClr val="accent1"/>
+          </a:fillRef>
+          <a:effectRef idx="0">
+            <a:schemeClr val="accent1"/>
+          </a:effectRef>
+          <a:fontRef idx="minor">
+            <a:schemeClr val="tx1"/>
+          </a:fontRef>
+        </p:style>
+      </p:cxnSp>
+      <p:cxnSp>
+        <p:nvCxnSpPr>
+          <p:cNvPr id="20" name="Connector: Elbow 19">
+            <a:extLst>
+              <a:ext uri="{FF2B5EF4-FFF2-40B4-BE49-F238E27FC236}">
+                <a16:creationId xmlns:a16="http://schemas.microsoft.com/office/drawing/2014/main" id="{06EAF55D-E831-4AE4-BCB3-A9B879CDF9AF}"/>
+              </a:ext>
+            </a:extLst>
+          </p:cNvPr>
+          <p:cNvCxnSpPr>
+            <a:cxnSpLocks/>
+            <a:stCxn id="4" idx="3"/>
+            <a:endCxn id="6" idx="0"/>
+          </p:cNvCxnSpPr>
+          <p:nvPr/>
+        </p:nvCxnSpPr>
+        <p:spPr>
+          <a:xfrm>
+            <a:off x="1872142" y="2430710"/>
+            <a:ext cx="931179" cy="457200"/>
+          </a:xfrm>
+          <a:prstGeom prst="bentConnector2">
+            <a:avLst/>
+          </a:prstGeom>
+          <a:ln>
+            <a:tailEnd type="triangle"/>
+          </a:ln>
+        </p:spPr>
+        <p:style>
+          <a:lnRef idx="1">
+            <a:schemeClr val="accent1"/>
+          </a:lnRef>
+          <a:fillRef idx="0">
+            <a:schemeClr val="accent1"/>
+          </a:fillRef>
+          <a:effectRef idx="0">
+            <a:schemeClr val="accent1"/>
+          </a:effectRef>
+          <a:fontRef idx="minor">
+            <a:schemeClr val="tx1"/>
+          </a:fontRef>
+        </p:style>
+      </p:cxnSp>
+      <p:cxnSp>
+        <p:nvCxnSpPr>
+          <p:cNvPr id="23" name="Connector: Elbow 22">
+            <a:extLst>
+              <a:ext uri="{FF2B5EF4-FFF2-40B4-BE49-F238E27FC236}">
+                <a16:creationId xmlns:a16="http://schemas.microsoft.com/office/drawing/2014/main" id="{4458971E-0D7A-487B-BB0F-F074ACCA4C20}"/>
+              </a:ext>
+            </a:extLst>
+          </p:cNvPr>
+          <p:cNvCxnSpPr>
+            <a:cxnSpLocks/>
+          </p:cNvCxnSpPr>
+          <p:nvPr/>
+        </p:nvCxnSpPr>
+        <p:spPr>
+          <a:xfrm flipV="1">
+            <a:off x="3432496" y="2887910"/>
+            <a:ext cx="931178" cy="457200"/>
+          </a:xfrm>
+          <a:prstGeom prst="bentConnector2">
+            <a:avLst/>
+          </a:prstGeom>
+          <a:ln>
+            <a:tailEnd type="triangle"/>
+          </a:ln>
+        </p:spPr>
+        <p:style>
+          <a:lnRef idx="1">
+            <a:schemeClr val="accent1"/>
+          </a:lnRef>
+          <a:fillRef idx="0">
+            <a:schemeClr val="accent1"/>
+          </a:fillRef>
+          <a:effectRef idx="0">
+            <a:schemeClr val="accent1"/>
+          </a:effectRef>
+          <a:fontRef idx="minor">
+            <a:schemeClr val="tx1"/>
+          </a:fontRef>
+        </p:style>
+      </p:cxnSp>
+      <p:cxnSp>
+        <p:nvCxnSpPr>
+          <p:cNvPr id="26" name="Connector: Elbow 25">
+            <a:extLst>
+              <a:ext uri="{FF2B5EF4-FFF2-40B4-BE49-F238E27FC236}">
+                <a16:creationId xmlns:a16="http://schemas.microsoft.com/office/drawing/2014/main" id="{9C6587B9-226F-41AA-957C-FD4FE5DF22F8}"/>
+              </a:ext>
+            </a:extLst>
+          </p:cNvPr>
+          <p:cNvCxnSpPr>
+            <a:cxnSpLocks/>
+            <a:stCxn id="5" idx="3"/>
+            <a:endCxn id="9" idx="0"/>
+          </p:cNvCxnSpPr>
+          <p:nvPr/>
+        </p:nvCxnSpPr>
+        <p:spPr>
+          <a:xfrm>
+            <a:off x="3407328" y="1516310"/>
+            <a:ext cx="931178" cy="457200"/>
+          </a:xfrm>
+          <a:prstGeom prst="bentConnector2">
+            <a:avLst/>
+          </a:prstGeom>
+          <a:ln>
+            <a:tailEnd type="triangle"/>
+          </a:ln>
+        </p:spPr>
+        <p:style>
+          <a:lnRef idx="1">
+            <a:schemeClr val="accent1"/>
+          </a:lnRef>
+          <a:fillRef idx="0">
+            <a:schemeClr val="accent1"/>
+          </a:fillRef>
+          <a:effectRef idx="0">
+            <a:schemeClr val="accent1"/>
+          </a:effectRef>
+          <a:fontRef idx="minor">
+            <a:schemeClr val="tx1"/>
+          </a:fontRef>
+        </p:style>
+      </p:cxnSp>
+      <p:cxnSp>
+        <p:nvCxnSpPr>
+          <p:cNvPr id="30" name="Connector: Elbow 29">
+            <a:extLst>
+              <a:ext uri="{FF2B5EF4-FFF2-40B4-BE49-F238E27FC236}">
+                <a16:creationId xmlns:a16="http://schemas.microsoft.com/office/drawing/2014/main" id="{C106A91D-4C3B-4C96-96B9-E59ACE74DC8E}"/>
+              </a:ext>
+            </a:extLst>
+          </p:cNvPr>
+          <p:cNvCxnSpPr>
+            <a:cxnSpLocks/>
+            <a:stCxn id="9" idx="3"/>
+            <a:endCxn id="7" idx="1"/>
+          </p:cNvCxnSpPr>
+          <p:nvPr/>
+        </p:nvCxnSpPr>
+        <p:spPr>
+          <a:xfrm>
+            <a:off x="4942513" y="2430710"/>
+            <a:ext cx="327175" cy="12700"/>
+          </a:xfrm>
+          <a:prstGeom prst="bentConnector3">
+            <a:avLst>
+              <a:gd name="adj1" fmla="val 50000"/>
+            </a:avLst>
+          </a:prstGeom>
+          <a:ln>
+            <a:tailEnd type="triangle"/>
+          </a:ln>
+        </p:spPr>
+        <p:style>
+          <a:lnRef idx="1">
+            <a:schemeClr val="accent1"/>
+          </a:lnRef>
+          <a:fillRef idx="0">
+            <a:schemeClr val="accent1"/>
+          </a:fillRef>
+          <a:effectRef idx="0">
+            <a:schemeClr val="accent1"/>
+          </a:effectRef>
+          <a:fontRef idx="minor">
+            <a:schemeClr val="tx1"/>
+          </a:fontRef>
+        </p:style>
+      </p:cxnSp>
+      <p:cxnSp>
+        <p:nvCxnSpPr>
+          <p:cNvPr id="35" name="Connector: Elbow 34">
+            <a:extLst>
+              <a:ext uri="{FF2B5EF4-FFF2-40B4-BE49-F238E27FC236}">
+                <a16:creationId xmlns:a16="http://schemas.microsoft.com/office/drawing/2014/main" id="{89B6B958-0754-4F91-BEB9-96A2010661FD}"/>
+              </a:ext>
+            </a:extLst>
+          </p:cNvPr>
+          <p:cNvCxnSpPr>
+            <a:cxnSpLocks/>
+            <a:stCxn id="7" idx="3"/>
+            <a:endCxn id="10" idx="1"/>
+          </p:cNvCxnSpPr>
+          <p:nvPr/>
+        </p:nvCxnSpPr>
+        <p:spPr>
+          <a:xfrm flipV="1">
+            <a:off x="6477703" y="1516310"/>
+            <a:ext cx="327167" cy="914400"/>
+          </a:xfrm>
+          <a:prstGeom prst="bentConnector3">
+            <a:avLst>
+              <a:gd name="adj1" fmla="val 50000"/>
+            </a:avLst>
+          </a:prstGeom>
+          <a:ln>
+            <a:tailEnd type="triangle"/>
+          </a:ln>
+        </p:spPr>
+        <p:style>
+          <a:lnRef idx="1">
+            <a:schemeClr val="accent1"/>
+          </a:lnRef>
+          <a:fillRef idx="0">
+            <a:schemeClr val="accent1"/>
+          </a:fillRef>
+          <a:effectRef idx="0">
+            <a:schemeClr val="accent1"/>
+          </a:effectRef>
+          <a:fontRef idx="minor">
+            <a:schemeClr val="tx1"/>
+          </a:fontRef>
+        </p:style>
+      </p:cxnSp>
+      <p:cxnSp>
+        <p:nvCxnSpPr>
+          <p:cNvPr id="38" name="Connector: Elbow 37">
+            <a:extLst>
+              <a:ext uri="{FF2B5EF4-FFF2-40B4-BE49-F238E27FC236}">
+                <a16:creationId xmlns:a16="http://schemas.microsoft.com/office/drawing/2014/main" id="{68413076-112C-4EAB-A4F2-E756B221B03B}"/>
+              </a:ext>
+            </a:extLst>
+          </p:cNvPr>
+          <p:cNvCxnSpPr>
+            <a:cxnSpLocks/>
+            <a:stCxn id="7" idx="3"/>
+            <a:endCxn id="11" idx="1"/>
+          </p:cNvCxnSpPr>
+          <p:nvPr/>
+        </p:nvCxnSpPr>
+        <p:spPr>
+          <a:xfrm>
+            <a:off x="6477703" y="2430710"/>
+            <a:ext cx="327168" cy="914400"/>
+          </a:xfrm>
+          <a:prstGeom prst="bentConnector3">
+            <a:avLst>
+              <a:gd name="adj1" fmla="val 50000"/>
+            </a:avLst>
+          </a:prstGeom>
+          <a:ln>
+            <a:tailEnd type="triangle"/>
+          </a:ln>
+        </p:spPr>
+        <p:style>
+          <a:lnRef idx="1">
+            <a:schemeClr val="accent1"/>
+          </a:lnRef>
+          <a:fillRef idx="0">
+            <a:schemeClr val="accent1"/>
+          </a:fillRef>
+          <a:effectRef idx="0">
+            <a:schemeClr val="accent1"/>
+          </a:effectRef>
+          <a:fontRef idx="minor">
+            <a:schemeClr val="tx1"/>
+          </a:fontRef>
+        </p:style>
+      </p:cxnSp>
+      <p:cxnSp>
+        <p:nvCxnSpPr>
+          <p:cNvPr id="41" name="Connector: Elbow 40">
+            <a:extLst>
+              <a:ext uri="{FF2B5EF4-FFF2-40B4-BE49-F238E27FC236}">
+                <a16:creationId xmlns:a16="http://schemas.microsoft.com/office/drawing/2014/main" id="{13FA7144-95A7-40CC-A802-3CA0EAD8614C}"/>
+              </a:ext>
+            </a:extLst>
+          </p:cNvPr>
+          <p:cNvCxnSpPr>
+            <a:cxnSpLocks/>
+            <a:stCxn id="10" idx="3"/>
+            <a:endCxn id="13" idx="1"/>
+          </p:cNvCxnSpPr>
+          <p:nvPr/>
+        </p:nvCxnSpPr>
+        <p:spPr>
+          <a:xfrm>
+            <a:off x="8012885" y="1516310"/>
+            <a:ext cx="327167" cy="12700"/>
+          </a:xfrm>
+          <a:prstGeom prst="bentConnector3">
+            <a:avLst>
+              <a:gd name="adj1" fmla="val 50000"/>
+            </a:avLst>
+          </a:prstGeom>
+          <a:ln>
+            <a:tailEnd type="triangle"/>
+          </a:ln>
+        </p:spPr>
+        <p:style>
+          <a:lnRef idx="1">
+            <a:schemeClr val="accent1"/>
+          </a:lnRef>
+          <a:fillRef idx="0">
+            <a:schemeClr val="accent1"/>
+          </a:fillRef>
+          <a:effectRef idx="0">
+            <a:schemeClr val="accent1"/>
+          </a:effectRef>
+          <a:fontRef idx="minor">
+            <a:schemeClr val="tx1"/>
+          </a:fontRef>
+        </p:style>
+      </p:cxnSp>
+      <p:cxnSp>
+        <p:nvCxnSpPr>
+          <p:cNvPr id="44" name="Connector: Elbow 43">
+            <a:extLst>
+              <a:ext uri="{FF2B5EF4-FFF2-40B4-BE49-F238E27FC236}">
+                <a16:creationId xmlns:a16="http://schemas.microsoft.com/office/drawing/2014/main" id="{13614186-E792-4806-BAB9-2166280B2152}"/>
+              </a:ext>
+            </a:extLst>
+          </p:cNvPr>
+          <p:cNvCxnSpPr>
+            <a:cxnSpLocks/>
+            <a:stCxn id="11" idx="3"/>
+            <a:endCxn id="12" idx="1"/>
+          </p:cNvCxnSpPr>
+          <p:nvPr/>
+        </p:nvCxnSpPr>
+        <p:spPr>
+          <a:xfrm>
+            <a:off x="8012886" y="3345110"/>
+            <a:ext cx="327166" cy="12700"/>
+          </a:xfrm>
+          <a:prstGeom prst="bentConnector3">
+            <a:avLst>
+              <a:gd name="adj1" fmla="val 50000"/>
+            </a:avLst>
+          </a:prstGeom>
+          <a:ln>
+            <a:tailEnd type="triangle"/>
+          </a:ln>
+        </p:spPr>
+        <p:style>
+          <a:lnRef idx="1">
+            <a:schemeClr val="accent1"/>
+          </a:lnRef>
+          <a:fillRef idx="0">
+            <a:schemeClr val="accent1"/>
+          </a:fillRef>
+          <a:effectRef idx="0">
+            <a:schemeClr val="accent1"/>
+          </a:effectRef>
+          <a:fontRef idx="minor">
+            <a:schemeClr val="tx1"/>
+          </a:fontRef>
+        </p:style>
+      </p:cxnSp>
+    </p:spTree>
+    <p:extLst>
+      <p:ext uri="{BB962C8B-B14F-4D97-AF65-F5344CB8AC3E}">
+        <p14:creationId xmlns:p14="http://schemas.microsoft.com/office/powerpoint/2010/main" val="539637265"/>
+      </p:ext>
+    </p:extLst>
+  </p:cSld>
+  <p:clrMapOvr>
+    <a:masterClrMapping/>
+  </p:clrMapOvr>
+</p:sld>
+</file>
+
 <file path=ppt/theme/theme1.xml><?xml version="1.0" encoding="utf-8"?>
 <a:theme xmlns:a="http://schemas.openxmlformats.org/drawingml/2006/main" name="Office Theme">
   <a:themeElements>

</xml_diff>

<commit_message>
avance en requerimientos adicionales, faltan detalles
</commit_message>
<xml_diff>
--- a/Informe/Images/MVP.pptx
+++ b/Informe/Images/MVP.pptx
@@ -7,6 +7,7 @@
   <p:sldIdLst>
     <p:sldId id="257" r:id="rId2"/>
     <p:sldId id="258" r:id="rId3"/>
+    <p:sldId id="259" r:id="rId4"/>
   </p:sldIdLst>
   <p:sldSz cx="12192000" cy="6858000"/>
   <p:notesSz cx="6858000" cy="9144000"/>
@@ -262,7 +263,7 @@
           <a:p>
             <a:fld id="{9393FD87-CB66-4628-A0CB-CD2678E0D5AC}" type="datetimeFigureOut">
               <a:rPr lang="es-BO" smtClean="0"/>
-              <a:t>20/12/2020</a:t>
+              <a:t>21/12/2020</a:t>
             </a:fld>
             <a:endParaRPr lang="es-BO"/>
           </a:p>
@@ -462,7 +463,7 @@
           <a:p>
             <a:fld id="{9393FD87-CB66-4628-A0CB-CD2678E0D5AC}" type="datetimeFigureOut">
               <a:rPr lang="es-BO" smtClean="0"/>
-              <a:t>20/12/2020</a:t>
+              <a:t>21/12/2020</a:t>
             </a:fld>
             <a:endParaRPr lang="es-BO"/>
           </a:p>
@@ -672,7 +673,7 @@
           <a:p>
             <a:fld id="{9393FD87-CB66-4628-A0CB-CD2678E0D5AC}" type="datetimeFigureOut">
               <a:rPr lang="es-BO" smtClean="0"/>
-              <a:t>20/12/2020</a:t>
+              <a:t>21/12/2020</a:t>
             </a:fld>
             <a:endParaRPr lang="es-BO"/>
           </a:p>
@@ -872,7 +873,7 @@
           <a:p>
             <a:fld id="{9393FD87-CB66-4628-A0CB-CD2678E0D5AC}" type="datetimeFigureOut">
               <a:rPr lang="es-BO" smtClean="0"/>
-              <a:t>20/12/2020</a:t>
+              <a:t>21/12/2020</a:t>
             </a:fld>
             <a:endParaRPr lang="es-BO"/>
           </a:p>
@@ -1148,7 +1149,7 @@
           <a:p>
             <a:fld id="{9393FD87-CB66-4628-A0CB-CD2678E0D5AC}" type="datetimeFigureOut">
               <a:rPr lang="es-BO" smtClean="0"/>
-              <a:t>20/12/2020</a:t>
+              <a:t>21/12/2020</a:t>
             </a:fld>
             <a:endParaRPr lang="es-BO"/>
           </a:p>
@@ -1416,7 +1417,7 @@
           <a:p>
             <a:fld id="{9393FD87-CB66-4628-A0CB-CD2678E0D5AC}" type="datetimeFigureOut">
               <a:rPr lang="es-BO" smtClean="0"/>
-              <a:t>20/12/2020</a:t>
+              <a:t>21/12/2020</a:t>
             </a:fld>
             <a:endParaRPr lang="es-BO"/>
           </a:p>
@@ -1831,7 +1832,7 @@
           <a:p>
             <a:fld id="{9393FD87-CB66-4628-A0CB-CD2678E0D5AC}" type="datetimeFigureOut">
               <a:rPr lang="es-BO" smtClean="0"/>
-              <a:t>20/12/2020</a:t>
+              <a:t>21/12/2020</a:t>
             </a:fld>
             <a:endParaRPr lang="es-BO"/>
           </a:p>
@@ -1973,7 +1974,7 @@
           <a:p>
             <a:fld id="{9393FD87-CB66-4628-A0CB-CD2678E0D5AC}" type="datetimeFigureOut">
               <a:rPr lang="es-BO" smtClean="0"/>
-              <a:t>20/12/2020</a:t>
+              <a:t>21/12/2020</a:t>
             </a:fld>
             <a:endParaRPr lang="es-BO"/>
           </a:p>
@@ -2086,7 +2087,7 @@
           <a:p>
             <a:fld id="{9393FD87-CB66-4628-A0CB-CD2678E0D5AC}" type="datetimeFigureOut">
               <a:rPr lang="es-BO" smtClean="0"/>
-              <a:t>20/12/2020</a:t>
+              <a:t>21/12/2020</a:t>
             </a:fld>
             <a:endParaRPr lang="es-BO"/>
           </a:p>
@@ -2399,7 +2400,7 @@
           <a:p>
             <a:fld id="{9393FD87-CB66-4628-A0CB-CD2678E0D5AC}" type="datetimeFigureOut">
               <a:rPr lang="es-BO" smtClean="0"/>
-              <a:t>20/12/2020</a:t>
+              <a:t>21/12/2020</a:t>
             </a:fld>
             <a:endParaRPr lang="es-BO"/>
           </a:p>
@@ -2688,7 +2689,7 @@
           <a:p>
             <a:fld id="{9393FD87-CB66-4628-A0CB-CD2678E0D5AC}" type="datetimeFigureOut">
               <a:rPr lang="es-BO" smtClean="0"/>
-              <a:t>20/12/2020</a:t>
+              <a:t>21/12/2020</a:t>
             </a:fld>
             <a:endParaRPr lang="es-BO"/>
           </a:p>
@@ -2931,7 +2932,7 @@
           <a:p>
             <a:fld id="{9393FD87-CB66-4628-A0CB-CD2678E0D5AC}" type="datetimeFigureOut">
               <a:rPr lang="es-BO" smtClean="0"/>
-              <a:t>20/12/2020</a:t>
+              <a:t>21/12/2020</a:t>
             </a:fld>
             <a:endParaRPr lang="es-BO"/>
           </a:p>
@@ -4423,7 +4424,7 @@
         </p:nvSpPr>
         <p:spPr>
           <a:xfrm>
-            <a:off x="4643132" y="5098558"/>
+            <a:off x="4639162" y="5402931"/>
             <a:ext cx="1324286" cy="280259"/>
           </a:xfrm>
           <a:prstGeom prst="rect">
@@ -4482,7 +4483,7 @@
         </p:nvSpPr>
         <p:spPr>
           <a:xfrm>
-            <a:off x="5968808" y="4916940"/>
+            <a:off x="4643132" y="5097154"/>
             <a:ext cx="1320316" cy="280259"/>
           </a:xfrm>
           <a:prstGeom prst="rect">
@@ -4522,7 +4523,184 @@
                   <a:schemeClr val="tx1"/>
                 </a:solidFill>
               </a:rPr>
+              <a:t>Datos</a:t>
+            </a:r>
+          </a:p>
+        </p:txBody>
+      </p:sp>
+      <p:sp>
+        <p:nvSpPr>
+          <p:cNvPr id="27" name="Rectangle 26">
+            <a:extLst>
+              <a:ext uri="{FF2B5EF4-FFF2-40B4-BE49-F238E27FC236}">
+                <a16:creationId xmlns:a16="http://schemas.microsoft.com/office/drawing/2014/main" id="{03957D0C-C19B-43F5-A2DE-DFF78499F79D}"/>
+              </a:ext>
+            </a:extLst>
+          </p:cNvPr>
+          <p:cNvSpPr/>
+          <p:nvPr/>
+        </p:nvSpPr>
+        <p:spPr>
+          <a:xfrm>
+            <a:off x="5972893" y="4560634"/>
+            <a:ext cx="1320316" cy="280259"/>
+          </a:xfrm>
+          <a:prstGeom prst="rect">
+            <a:avLst/>
+          </a:prstGeom>
+          <a:solidFill>
+            <a:schemeClr val="bg1"/>
+          </a:solidFill>
+          <a:ln>
+            <a:solidFill>
+              <a:schemeClr val="tx1"/>
+            </a:solidFill>
+          </a:ln>
+        </p:spPr>
+        <p:style>
+          <a:lnRef idx="0">
+            <a:scrgbClr r="0" g="0" b="0"/>
+          </a:lnRef>
+          <a:fillRef idx="0">
+            <a:scrgbClr r="0" g="0" b="0"/>
+          </a:fillRef>
+          <a:effectRef idx="0">
+            <a:scrgbClr r="0" g="0" b="0"/>
+          </a:effectRef>
+          <a:fontRef idx="minor">
+            <a:schemeClr val="lt1"/>
+          </a:fontRef>
+        </p:style>
+        <p:txBody>
+          <a:bodyPr rtlCol="0" anchor="ctr"/>
+          <a:lstStyle/>
+          <a:p>
+            <a:pPr algn="ctr"/>
+            <a:r>
+              <a:rPr lang="es-BO" dirty="0">
+                <a:solidFill>
+                  <a:schemeClr val="tx1"/>
+                </a:solidFill>
+              </a:rPr>
               <a:t>Tiempo</a:t>
+            </a:r>
+          </a:p>
+        </p:txBody>
+      </p:sp>
+      <p:sp>
+        <p:nvSpPr>
+          <p:cNvPr id="29" name="Rectangle 28">
+            <a:extLst>
+              <a:ext uri="{FF2B5EF4-FFF2-40B4-BE49-F238E27FC236}">
+                <a16:creationId xmlns:a16="http://schemas.microsoft.com/office/drawing/2014/main" id="{B5D13B83-DC31-409D-ABA8-E1B5EDBB7E3F}"/>
+              </a:ext>
+            </a:extLst>
+          </p:cNvPr>
+          <p:cNvSpPr/>
+          <p:nvPr/>
+        </p:nvSpPr>
+        <p:spPr>
+          <a:xfrm>
+            <a:off x="5968130" y="4923693"/>
+            <a:ext cx="1320316" cy="280259"/>
+          </a:xfrm>
+          <a:prstGeom prst="rect">
+            <a:avLst/>
+          </a:prstGeom>
+          <a:solidFill>
+            <a:schemeClr val="bg1"/>
+          </a:solidFill>
+          <a:ln>
+            <a:solidFill>
+              <a:schemeClr val="tx1"/>
+            </a:solidFill>
+          </a:ln>
+        </p:spPr>
+        <p:style>
+          <a:lnRef idx="0">
+            <a:scrgbClr r="0" g="0" b="0"/>
+          </a:lnRef>
+          <a:fillRef idx="0">
+            <a:scrgbClr r="0" g="0" b="0"/>
+          </a:fillRef>
+          <a:effectRef idx="0">
+            <a:scrgbClr r="0" g="0" b="0"/>
+          </a:effectRef>
+          <a:fontRef idx="minor">
+            <a:schemeClr val="lt1"/>
+          </a:fontRef>
+        </p:style>
+        <p:txBody>
+          <a:bodyPr rtlCol="0" anchor="ctr"/>
+          <a:lstStyle/>
+          <a:p>
+            <a:pPr algn="ctr"/>
+            <a:r>
+              <a:rPr lang="es-BO" sz="1100" dirty="0">
+                <a:solidFill>
+                  <a:schemeClr val="tx1"/>
+                </a:solidFill>
+              </a:rPr>
+              <a:t>Tiempo entre poses</a:t>
+            </a:r>
+          </a:p>
+        </p:txBody>
+      </p:sp>
+      <p:sp>
+        <p:nvSpPr>
+          <p:cNvPr id="30" name="Rectangle 29">
+            <a:extLst>
+              <a:ext uri="{FF2B5EF4-FFF2-40B4-BE49-F238E27FC236}">
+                <a16:creationId xmlns:a16="http://schemas.microsoft.com/office/drawing/2014/main" id="{015A8B7E-4EB3-42CB-B7B4-855EA9FBAE0D}"/>
+              </a:ext>
+            </a:extLst>
+          </p:cNvPr>
+          <p:cNvSpPr/>
+          <p:nvPr/>
+        </p:nvSpPr>
+        <p:spPr>
+          <a:xfrm>
+            <a:off x="5968130" y="5252243"/>
+            <a:ext cx="1320316" cy="280259"/>
+          </a:xfrm>
+          <a:prstGeom prst="rect">
+            <a:avLst/>
+          </a:prstGeom>
+          <a:solidFill>
+            <a:schemeClr val="bg1"/>
+          </a:solidFill>
+          <a:ln>
+            <a:solidFill>
+              <a:schemeClr val="tx1"/>
+            </a:solidFill>
+          </a:ln>
+        </p:spPr>
+        <p:style>
+          <a:lnRef idx="0">
+            <a:scrgbClr r="0" g="0" b="0"/>
+          </a:lnRef>
+          <a:fillRef idx="0">
+            <a:scrgbClr r="0" g="0" b="0"/>
+          </a:fillRef>
+          <a:effectRef idx="0">
+            <a:scrgbClr r="0" g="0" b="0"/>
+          </a:effectRef>
+          <a:fontRef idx="minor">
+            <a:schemeClr val="lt1"/>
+          </a:fontRef>
+        </p:style>
+        <p:txBody>
+          <a:bodyPr rtlCol="0" anchor="ctr"/>
+          <a:lstStyle/>
+          <a:p>
+            <a:pPr algn="ctr"/>
+            <a:r>
+              <a:rPr lang="es-BO" sz="1200" dirty="0">
+                <a:solidFill>
+                  <a:schemeClr val="tx1"/>
+                </a:solidFill>
+              </a:rPr>
+              <a:t>Imagen Generada</a:t>
             </a:r>
           </a:p>
         </p:txBody>
@@ -5565,6 +5743,731 @@
     <p:extLst>
       <p:ext uri="{BB962C8B-B14F-4D97-AF65-F5344CB8AC3E}">
         <p14:creationId xmlns:p14="http://schemas.microsoft.com/office/powerpoint/2010/main" val="539637265"/>
+      </p:ext>
+    </p:extLst>
+  </p:cSld>
+  <p:clrMapOvr>
+    <a:masterClrMapping/>
+  </p:clrMapOvr>
+</p:sld>
+</file>
+
+<file path=ppt/slides/slide3.xml><?xml version="1.0" encoding="utf-8"?>
+<p:sld xmlns:a="http://schemas.openxmlformats.org/drawingml/2006/main" xmlns:r="http://schemas.openxmlformats.org/officeDocument/2006/relationships" xmlns:p="http://schemas.openxmlformats.org/presentationml/2006/main">
+  <p:cSld>
+    <p:spTree>
+      <p:nvGrpSpPr>
+        <p:cNvPr id="1" name=""/>
+        <p:cNvGrpSpPr/>
+        <p:nvPr/>
+      </p:nvGrpSpPr>
+      <p:grpSpPr>
+        <a:xfrm>
+          <a:off x="0" y="0"/>
+          <a:ext cx="0" cy="0"/>
+          <a:chOff x="0" y="0"/>
+          <a:chExt cx="0" cy="0"/>
+        </a:xfrm>
+      </p:grpSpPr>
+      <p:sp>
+        <p:nvSpPr>
+          <p:cNvPr id="4" name="Rectangle 3">
+            <a:extLst>
+              <a:ext uri="{FF2B5EF4-FFF2-40B4-BE49-F238E27FC236}">
+                <a16:creationId xmlns:a16="http://schemas.microsoft.com/office/drawing/2014/main" id="{2DA9C801-17C0-4333-B283-085D799155A0}"/>
+              </a:ext>
+            </a:extLst>
+          </p:cNvPr>
+          <p:cNvSpPr/>
+          <p:nvPr/>
+        </p:nvSpPr>
+        <p:spPr>
+          <a:xfrm>
+            <a:off x="664127" y="1973510"/>
+            <a:ext cx="1208015" cy="914400"/>
+          </a:xfrm>
+          <a:prstGeom prst="rect">
+            <a:avLst/>
+          </a:prstGeom>
+          <a:solidFill>
+            <a:schemeClr val="bg1"/>
+          </a:solidFill>
+          <a:ln>
+            <a:solidFill>
+              <a:schemeClr val="tx1"/>
+            </a:solidFill>
+          </a:ln>
+        </p:spPr>
+        <p:style>
+          <a:lnRef idx="2">
+            <a:schemeClr val="dk1">
+              <a:shade val="50000"/>
+            </a:schemeClr>
+          </a:lnRef>
+          <a:fillRef idx="1">
+            <a:schemeClr val="dk1"/>
+          </a:fillRef>
+          <a:effectRef idx="0">
+            <a:schemeClr val="dk1"/>
+          </a:effectRef>
+          <a:fontRef idx="minor">
+            <a:schemeClr val="lt1"/>
+          </a:fontRef>
+        </p:style>
+        <p:txBody>
+          <a:bodyPr rtlCol="0" anchor="ctr"/>
+          <a:lstStyle/>
+          <a:p>
+            <a:pPr algn="ctr"/>
+            <a:r>
+              <a:rPr lang="es-BO" sz="1600" dirty="0">
+                <a:solidFill>
+                  <a:schemeClr val="tx1"/>
+                </a:solidFill>
+              </a:rPr>
+              <a:t>1: Vídeo</a:t>
+            </a:r>
+          </a:p>
+        </p:txBody>
+      </p:sp>
+      <p:sp>
+        <p:nvSpPr>
+          <p:cNvPr id="7" name="Rectangle 6">
+            <a:extLst>
+              <a:ext uri="{FF2B5EF4-FFF2-40B4-BE49-F238E27FC236}">
+                <a16:creationId xmlns:a16="http://schemas.microsoft.com/office/drawing/2014/main" id="{B1A92854-3D6C-4789-80B8-EAED115F9467}"/>
+              </a:ext>
+            </a:extLst>
+          </p:cNvPr>
+          <p:cNvSpPr/>
+          <p:nvPr/>
+        </p:nvSpPr>
+        <p:spPr>
+          <a:xfrm>
+            <a:off x="5269688" y="1973510"/>
+            <a:ext cx="1208015" cy="914400"/>
+          </a:xfrm>
+          <a:prstGeom prst="rect">
+            <a:avLst/>
+          </a:prstGeom>
+          <a:solidFill>
+            <a:schemeClr val="bg1"/>
+          </a:solidFill>
+          <a:ln>
+            <a:solidFill>
+              <a:schemeClr val="tx1"/>
+            </a:solidFill>
+          </a:ln>
+        </p:spPr>
+        <p:style>
+          <a:lnRef idx="2">
+            <a:schemeClr val="dk1">
+              <a:shade val="50000"/>
+            </a:schemeClr>
+          </a:lnRef>
+          <a:fillRef idx="1">
+            <a:schemeClr val="dk1"/>
+          </a:fillRef>
+          <a:effectRef idx="0">
+            <a:schemeClr val="dk1"/>
+          </a:effectRef>
+          <a:fontRef idx="minor">
+            <a:schemeClr val="lt1"/>
+          </a:fontRef>
+        </p:style>
+        <p:txBody>
+          <a:bodyPr rtlCol="0" anchor="ctr"/>
+          <a:lstStyle/>
+          <a:p>
+            <a:pPr algn="ctr"/>
+            <a:r>
+              <a:rPr lang="es-BO" sz="1600" dirty="0">
+                <a:solidFill>
+                  <a:schemeClr val="tx1"/>
+                </a:solidFill>
+              </a:rPr>
+              <a:t>4: .txt</a:t>
+            </a:r>
+          </a:p>
+        </p:txBody>
+      </p:sp>
+      <p:sp>
+        <p:nvSpPr>
+          <p:cNvPr id="8" name="Rectangle 7">
+            <a:extLst>
+              <a:ext uri="{FF2B5EF4-FFF2-40B4-BE49-F238E27FC236}">
+                <a16:creationId xmlns:a16="http://schemas.microsoft.com/office/drawing/2014/main" id="{51D9BAC8-C328-49C2-AFEF-A1DDD45A231D}"/>
+              </a:ext>
+            </a:extLst>
+          </p:cNvPr>
+          <p:cNvSpPr/>
+          <p:nvPr/>
+        </p:nvSpPr>
+        <p:spPr>
+          <a:xfrm>
+            <a:off x="5269687" y="3345110"/>
+            <a:ext cx="1208015" cy="914400"/>
+          </a:xfrm>
+          <a:prstGeom prst="rect">
+            <a:avLst/>
+          </a:prstGeom>
+          <a:solidFill>
+            <a:schemeClr val="bg1"/>
+          </a:solidFill>
+          <a:ln>
+            <a:solidFill>
+              <a:schemeClr val="tx1"/>
+            </a:solidFill>
+          </a:ln>
+        </p:spPr>
+        <p:style>
+          <a:lnRef idx="2">
+            <a:schemeClr val="dk1">
+              <a:shade val="50000"/>
+            </a:schemeClr>
+          </a:lnRef>
+          <a:fillRef idx="1">
+            <a:schemeClr val="dk1"/>
+          </a:fillRef>
+          <a:effectRef idx="0">
+            <a:schemeClr val="dk1"/>
+          </a:effectRef>
+          <a:fontRef idx="minor">
+            <a:schemeClr val="lt1"/>
+          </a:fontRef>
+        </p:style>
+        <p:txBody>
+          <a:bodyPr rtlCol="0" anchor="ctr"/>
+          <a:lstStyle/>
+          <a:p>
+            <a:pPr algn="ctr"/>
+            <a:r>
+              <a:rPr lang="es-BO" sz="1600" dirty="0">
+                <a:solidFill>
+                  <a:schemeClr val="tx1"/>
+                </a:solidFill>
+              </a:rPr>
+              <a:t>6: Normalizar</a:t>
+            </a:r>
+          </a:p>
+        </p:txBody>
+      </p:sp>
+      <p:sp>
+        <p:nvSpPr>
+          <p:cNvPr id="9" name="Rectangle 8">
+            <a:extLst>
+              <a:ext uri="{FF2B5EF4-FFF2-40B4-BE49-F238E27FC236}">
+                <a16:creationId xmlns:a16="http://schemas.microsoft.com/office/drawing/2014/main" id="{07FBFCA2-C299-4B85-BBA2-F868BDFE10BB}"/>
+              </a:ext>
+            </a:extLst>
+          </p:cNvPr>
+          <p:cNvSpPr/>
+          <p:nvPr/>
+        </p:nvSpPr>
+        <p:spPr>
+          <a:xfrm>
+            <a:off x="3734489" y="1973370"/>
+            <a:ext cx="1208015" cy="914400"/>
+          </a:xfrm>
+          <a:prstGeom prst="rect">
+            <a:avLst/>
+          </a:prstGeom>
+          <a:solidFill>
+            <a:schemeClr val="bg1"/>
+          </a:solidFill>
+          <a:ln>
+            <a:solidFill>
+              <a:schemeClr val="tx1"/>
+            </a:solidFill>
+          </a:ln>
+        </p:spPr>
+        <p:style>
+          <a:lnRef idx="2">
+            <a:schemeClr val="dk1">
+              <a:shade val="50000"/>
+            </a:schemeClr>
+          </a:lnRef>
+          <a:fillRef idx="1">
+            <a:schemeClr val="dk1"/>
+          </a:fillRef>
+          <a:effectRef idx="0">
+            <a:schemeClr val="dk1"/>
+          </a:effectRef>
+          <a:fontRef idx="minor">
+            <a:schemeClr val="lt1"/>
+          </a:fontRef>
+        </p:style>
+        <p:txBody>
+          <a:bodyPr rtlCol="0" anchor="ctr"/>
+          <a:lstStyle/>
+          <a:p>
+            <a:pPr algn="ctr"/>
+            <a:r>
+              <a:rPr lang="es-BO" sz="1600" dirty="0">
+                <a:solidFill>
+                  <a:schemeClr val="tx1"/>
+                </a:solidFill>
+              </a:rPr>
+              <a:t>3: Filtrar Poses</a:t>
+            </a:r>
+          </a:p>
+        </p:txBody>
+      </p:sp>
+      <p:sp>
+        <p:nvSpPr>
+          <p:cNvPr id="10" name="Rectangle 9">
+            <a:extLst>
+              <a:ext uri="{FF2B5EF4-FFF2-40B4-BE49-F238E27FC236}">
+                <a16:creationId xmlns:a16="http://schemas.microsoft.com/office/drawing/2014/main" id="{42C18BF8-498B-44ED-92F9-15B4530EC240}"/>
+              </a:ext>
+            </a:extLst>
+          </p:cNvPr>
+          <p:cNvSpPr/>
+          <p:nvPr/>
+        </p:nvSpPr>
+        <p:spPr>
+          <a:xfrm>
+            <a:off x="3734490" y="3344830"/>
+            <a:ext cx="1208015" cy="914400"/>
+          </a:xfrm>
+          <a:prstGeom prst="rect">
+            <a:avLst/>
+          </a:prstGeom>
+          <a:solidFill>
+            <a:schemeClr val="bg1"/>
+          </a:solidFill>
+          <a:ln>
+            <a:solidFill>
+              <a:schemeClr val="tx1"/>
+            </a:solidFill>
+          </a:ln>
+        </p:spPr>
+        <p:style>
+          <a:lnRef idx="2">
+            <a:schemeClr val="dk1">
+              <a:shade val="50000"/>
+            </a:schemeClr>
+          </a:lnRef>
+          <a:fillRef idx="1">
+            <a:schemeClr val="dk1"/>
+          </a:fillRef>
+          <a:effectRef idx="0">
+            <a:schemeClr val="dk1"/>
+          </a:effectRef>
+          <a:fontRef idx="minor">
+            <a:schemeClr val="lt1"/>
+          </a:fontRef>
+        </p:style>
+        <p:txBody>
+          <a:bodyPr rtlCol="0" anchor="ctr"/>
+          <a:lstStyle/>
+          <a:p>
+            <a:pPr algn="ctr"/>
+            <a:r>
+              <a:rPr lang="es-BO" sz="1600" dirty="0">
+                <a:solidFill>
+                  <a:schemeClr val="tx1"/>
+                </a:solidFill>
+              </a:rPr>
+              <a:t>5: Un .txt</a:t>
+            </a:r>
+          </a:p>
+        </p:txBody>
+      </p:sp>
+      <p:sp>
+        <p:nvSpPr>
+          <p:cNvPr id="13" name="Rectangle 12">
+            <a:extLst>
+              <a:ext uri="{FF2B5EF4-FFF2-40B4-BE49-F238E27FC236}">
+                <a16:creationId xmlns:a16="http://schemas.microsoft.com/office/drawing/2014/main" id="{F743095B-7448-4B08-8B3C-D009787F3961}"/>
+              </a:ext>
+            </a:extLst>
+          </p:cNvPr>
+          <p:cNvSpPr/>
+          <p:nvPr/>
+        </p:nvSpPr>
+        <p:spPr>
+          <a:xfrm>
+            <a:off x="2199300" y="3344970"/>
+            <a:ext cx="1208015" cy="914400"/>
+          </a:xfrm>
+          <a:prstGeom prst="rect">
+            <a:avLst/>
+          </a:prstGeom>
+          <a:solidFill>
+            <a:schemeClr val="bg1"/>
+          </a:solidFill>
+          <a:ln>
+            <a:solidFill>
+              <a:schemeClr val="tx1"/>
+            </a:solidFill>
+          </a:ln>
+        </p:spPr>
+        <p:style>
+          <a:lnRef idx="2">
+            <a:schemeClr val="dk1">
+              <a:shade val="50000"/>
+            </a:schemeClr>
+          </a:lnRef>
+          <a:fillRef idx="1">
+            <a:schemeClr val="dk1"/>
+          </a:fillRef>
+          <a:effectRef idx="0">
+            <a:schemeClr val="dk1"/>
+          </a:effectRef>
+          <a:fontRef idx="minor">
+            <a:schemeClr val="lt1"/>
+          </a:fontRef>
+        </p:style>
+        <p:txBody>
+          <a:bodyPr rtlCol="0" anchor="ctr"/>
+          <a:lstStyle/>
+          <a:p>
+            <a:pPr algn="ctr"/>
+            <a:r>
+              <a:rPr lang="es-BO" sz="1400" dirty="0">
+                <a:solidFill>
+                  <a:schemeClr val="tx1"/>
+                </a:solidFill>
+              </a:rPr>
+              <a:t>6: Calificación por Límite de Tiempo</a:t>
+            </a:r>
+          </a:p>
+        </p:txBody>
+      </p:sp>
+      <p:cxnSp>
+        <p:nvCxnSpPr>
+          <p:cNvPr id="19" name="Connector: Elbow 18">
+            <a:extLst>
+              <a:ext uri="{FF2B5EF4-FFF2-40B4-BE49-F238E27FC236}">
+                <a16:creationId xmlns:a16="http://schemas.microsoft.com/office/drawing/2014/main" id="{0B5E59B5-A6A5-444F-BFBE-11CC80562AD1}"/>
+              </a:ext>
+            </a:extLst>
+          </p:cNvPr>
+          <p:cNvCxnSpPr>
+            <a:cxnSpLocks/>
+            <a:stCxn id="4" idx="3"/>
+            <a:endCxn id="31" idx="1"/>
+          </p:cNvCxnSpPr>
+          <p:nvPr/>
+        </p:nvCxnSpPr>
+        <p:spPr>
+          <a:xfrm flipV="1">
+            <a:off x="1872142" y="2430640"/>
+            <a:ext cx="327166" cy="70"/>
+          </a:xfrm>
+          <a:prstGeom prst="bentConnector3">
+            <a:avLst>
+              <a:gd name="adj1" fmla="val 50000"/>
+            </a:avLst>
+          </a:prstGeom>
+          <a:ln>
+            <a:tailEnd type="triangle"/>
+          </a:ln>
+        </p:spPr>
+        <p:style>
+          <a:lnRef idx="1">
+            <a:schemeClr val="accent1"/>
+          </a:lnRef>
+          <a:fillRef idx="0">
+            <a:schemeClr val="accent1"/>
+          </a:fillRef>
+          <a:effectRef idx="0">
+            <a:schemeClr val="accent1"/>
+          </a:effectRef>
+          <a:fontRef idx="minor">
+            <a:schemeClr val="tx1"/>
+          </a:fontRef>
+        </p:style>
+      </p:cxnSp>
+      <p:cxnSp>
+        <p:nvCxnSpPr>
+          <p:cNvPr id="30" name="Connector: Elbow 29">
+            <a:extLst>
+              <a:ext uri="{FF2B5EF4-FFF2-40B4-BE49-F238E27FC236}">
+                <a16:creationId xmlns:a16="http://schemas.microsoft.com/office/drawing/2014/main" id="{C106A91D-4C3B-4C96-96B9-E59ACE74DC8E}"/>
+              </a:ext>
+            </a:extLst>
+          </p:cNvPr>
+          <p:cNvCxnSpPr>
+            <a:cxnSpLocks/>
+            <a:stCxn id="9" idx="3"/>
+            <a:endCxn id="7" idx="1"/>
+          </p:cNvCxnSpPr>
+          <p:nvPr/>
+        </p:nvCxnSpPr>
+        <p:spPr>
+          <a:xfrm>
+            <a:off x="4942504" y="2430570"/>
+            <a:ext cx="327184" cy="140"/>
+          </a:xfrm>
+          <a:prstGeom prst="bentConnector3">
+            <a:avLst>
+              <a:gd name="adj1" fmla="val 50000"/>
+            </a:avLst>
+          </a:prstGeom>
+          <a:ln>
+            <a:tailEnd type="triangle"/>
+          </a:ln>
+        </p:spPr>
+        <p:style>
+          <a:lnRef idx="1">
+            <a:schemeClr val="accent1"/>
+          </a:lnRef>
+          <a:fillRef idx="0">
+            <a:schemeClr val="accent1"/>
+          </a:fillRef>
+          <a:effectRef idx="0">
+            <a:schemeClr val="accent1"/>
+          </a:effectRef>
+          <a:fontRef idx="minor">
+            <a:schemeClr val="tx1"/>
+          </a:fontRef>
+        </p:style>
+      </p:cxnSp>
+      <p:cxnSp>
+        <p:nvCxnSpPr>
+          <p:cNvPr id="35" name="Connector: Elbow 34">
+            <a:extLst>
+              <a:ext uri="{FF2B5EF4-FFF2-40B4-BE49-F238E27FC236}">
+                <a16:creationId xmlns:a16="http://schemas.microsoft.com/office/drawing/2014/main" id="{89B6B958-0754-4F91-BEB9-96A2010661FD}"/>
+              </a:ext>
+            </a:extLst>
+          </p:cNvPr>
+          <p:cNvCxnSpPr>
+            <a:cxnSpLocks/>
+            <a:stCxn id="8" idx="1"/>
+            <a:endCxn id="10" idx="3"/>
+          </p:cNvCxnSpPr>
+          <p:nvPr/>
+        </p:nvCxnSpPr>
+        <p:spPr>
+          <a:xfrm rot="10800000">
+            <a:off x="4942505" y="3802030"/>
+            <a:ext cx="327182" cy="280"/>
+          </a:xfrm>
+          <a:prstGeom prst="bentConnector3">
+            <a:avLst>
+              <a:gd name="adj1" fmla="val 50000"/>
+            </a:avLst>
+          </a:prstGeom>
+          <a:ln>
+            <a:tailEnd type="triangle"/>
+          </a:ln>
+        </p:spPr>
+        <p:style>
+          <a:lnRef idx="1">
+            <a:schemeClr val="accent1"/>
+          </a:lnRef>
+          <a:fillRef idx="0">
+            <a:schemeClr val="accent1"/>
+          </a:fillRef>
+          <a:effectRef idx="0">
+            <a:schemeClr val="accent1"/>
+          </a:effectRef>
+          <a:fontRef idx="minor">
+            <a:schemeClr val="tx1"/>
+          </a:fontRef>
+        </p:style>
+      </p:cxnSp>
+      <p:cxnSp>
+        <p:nvCxnSpPr>
+          <p:cNvPr id="38" name="Connector: Elbow 37">
+            <a:extLst>
+              <a:ext uri="{FF2B5EF4-FFF2-40B4-BE49-F238E27FC236}">
+                <a16:creationId xmlns:a16="http://schemas.microsoft.com/office/drawing/2014/main" id="{68413076-112C-4EAB-A4F2-E756B221B03B}"/>
+              </a:ext>
+            </a:extLst>
+          </p:cNvPr>
+          <p:cNvCxnSpPr>
+            <a:cxnSpLocks/>
+            <a:stCxn id="7" idx="3"/>
+            <a:endCxn id="8" idx="3"/>
+          </p:cNvCxnSpPr>
+          <p:nvPr/>
+        </p:nvCxnSpPr>
+        <p:spPr>
+          <a:xfrm flipH="1">
+            <a:off x="6477702" y="2430710"/>
+            <a:ext cx="1" cy="1371600"/>
+          </a:xfrm>
+          <a:prstGeom prst="bentConnector3">
+            <a:avLst>
+              <a:gd name="adj1" fmla="val -22860000000"/>
+            </a:avLst>
+          </a:prstGeom>
+          <a:ln>
+            <a:tailEnd type="triangle"/>
+          </a:ln>
+        </p:spPr>
+        <p:style>
+          <a:lnRef idx="1">
+            <a:schemeClr val="accent1"/>
+          </a:lnRef>
+          <a:fillRef idx="0">
+            <a:schemeClr val="accent1"/>
+          </a:fillRef>
+          <a:effectRef idx="0">
+            <a:schemeClr val="accent1"/>
+          </a:effectRef>
+          <a:fontRef idx="minor">
+            <a:schemeClr val="tx1"/>
+          </a:fontRef>
+        </p:style>
+      </p:cxnSp>
+      <p:cxnSp>
+        <p:nvCxnSpPr>
+          <p:cNvPr id="41" name="Connector: Elbow 40">
+            <a:extLst>
+              <a:ext uri="{FF2B5EF4-FFF2-40B4-BE49-F238E27FC236}">
+                <a16:creationId xmlns:a16="http://schemas.microsoft.com/office/drawing/2014/main" id="{13FA7144-95A7-40CC-A802-3CA0EAD8614C}"/>
+              </a:ext>
+            </a:extLst>
+          </p:cNvPr>
+          <p:cNvCxnSpPr>
+            <a:cxnSpLocks/>
+            <a:stCxn id="10" idx="1"/>
+            <a:endCxn id="13" idx="3"/>
+          </p:cNvCxnSpPr>
+          <p:nvPr/>
+        </p:nvCxnSpPr>
+        <p:spPr>
+          <a:xfrm rot="10800000" flipV="1">
+            <a:off x="3407316" y="3802030"/>
+            <a:ext cx="327175" cy="140"/>
+          </a:xfrm>
+          <a:prstGeom prst="bentConnector3">
+            <a:avLst>
+              <a:gd name="adj1" fmla="val 50000"/>
+            </a:avLst>
+          </a:prstGeom>
+          <a:ln>
+            <a:tailEnd type="triangle"/>
+          </a:ln>
+        </p:spPr>
+        <p:style>
+          <a:lnRef idx="1">
+            <a:schemeClr val="accent1"/>
+          </a:lnRef>
+          <a:fillRef idx="0">
+            <a:schemeClr val="accent1"/>
+          </a:fillRef>
+          <a:effectRef idx="0">
+            <a:schemeClr val="accent1"/>
+          </a:effectRef>
+          <a:fontRef idx="minor">
+            <a:schemeClr val="tx1"/>
+          </a:fontRef>
+        </p:style>
+      </p:cxnSp>
+      <p:sp>
+        <p:nvSpPr>
+          <p:cNvPr id="31" name="Rectangle 30">
+            <a:extLst>
+              <a:ext uri="{FF2B5EF4-FFF2-40B4-BE49-F238E27FC236}">
+                <a16:creationId xmlns:a16="http://schemas.microsoft.com/office/drawing/2014/main" id="{C9D9D049-9153-42F0-BC5A-742B25CA0ADA}"/>
+              </a:ext>
+            </a:extLst>
+          </p:cNvPr>
+          <p:cNvSpPr/>
+          <p:nvPr/>
+        </p:nvSpPr>
+        <p:spPr>
+          <a:xfrm>
+            <a:off x="2199308" y="1973440"/>
+            <a:ext cx="1208015" cy="914400"/>
+          </a:xfrm>
+          <a:prstGeom prst="rect">
+            <a:avLst/>
+          </a:prstGeom>
+          <a:solidFill>
+            <a:schemeClr val="bg1"/>
+          </a:solidFill>
+          <a:ln>
+            <a:solidFill>
+              <a:schemeClr val="tx1"/>
+            </a:solidFill>
+          </a:ln>
+        </p:spPr>
+        <p:style>
+          <a:lnRef idx="2">
+            <a:schemeClr val="dk1">
+              <a:shade val="50000"/>
+            </a:schemeClr>
+          </a:lnRef>
+          <a:fillRef idx="1">
+            <a:schemeClr val="dk1"/>
+          </a:fillRef>
+          <a:effectRef idx="0">
+            <a:schemeClr val="dk1"/>
+          </a:effectRef>
+          <a:fontRef idx="minor">
+            <a:schemeClr val="lt1"/>
+          </a:fontRef>
+        </p:style>
+        <p:txBody>
+          <a:bodyPr rtlCol="0" anchor="ctr"/>
+          <a:lstStyle/>
+          <a:p>
+            <a:pPr algn="ctr"/>
+            <a:r>
+              <a:rPr lang="es-BO" sz="1600" dirty="0">
+                <a:solidFill>
+                  <a:schemeClr val="tx1"/>
+                </a:solidFill>
+              </a:rPr>
+              <a:t>2: Llenar datos del Mapa</a:t>
+            </a:r>
+          </a:p>
+        </p:txBody>
+      </p:sp>
+      <p:cxnSp>
+        <p:nvCxnSpPr>
+          <p:cNvPr id="33" name="Connector: Elbow 32">
+            <a:extLst>
+              <a:ext uri="{FF2B5EF4-FFF2-40B4-BE49-F238E27FC236}">
+                <a16:creationId xmlns:a16="http://schemas.microsoft.com/office/drawing/2014/main" id="{DEA75754-D2CA-4C82-9ED0-3EB11139C122}"/>
+              </a:ext>
+            </a:extLst>
+          </p:cNvPr>
+          <p:cNvCxnSpPr>
+            <a:cxnSpLocks/>
+          </p:cNvCxnSpPr>
+          <p:nvPr/>
+        </p:nvCxnSpPr>
+        <p:spPr>
+          <a:xfrm flipV="1">
+            <a:off x="3407323" y="2443340"/>
+            <a:ext cx="327166" cy="70"/>
+          </a:xfrm>
+          <a:prstGeom prst="bentConnector3">
+            <a:avLst>
+              <a:gd name="adj1" fmla="val 50000"/>
+            </a:avLst>
+          </a:prstGeom>
+          <a:ln>
+            <a:tailEnd type="triangle"/>
+          </a:ln>
+        </p:spPr>
+        <p:style>
+          <a:lnRef idx="1">
+            <a:schemeClr val="accent1"/>
+          </a:lnRef>
+          <a:fillRef idx="0">
+            <a:schemeClr val="accent1"/>
+          </a:fillRef>
+          <a:effectRef idx="0">
+            <a:schemeClr val="accent1"/>
+          </a:effectRef>
+          <a:fontRef idx="minor">
+            <a:schemeClr val="tx1"/>
+          </a:fontRef>
+        </p:style>
+      </p:cxnSp>
+    </p:spTree>
+    <p:extLst>
+      <p:ext uri="{BB962C8B-B14F-4D97-AF65-F5344CB8AC3E}">
+        <p14:creationId xmlns:p14="http://schemas.microsoft.com/office/powerpoint/2010/main" val="2255974881"/>
       </p:ext>
     </p:extLst>
   </p:cSld>

</xml_diff>